<commit_message>
avancer machine état créer
</commit_message>
<xml_diff>
--- a/Concep/MachineEtat.pptx
+++ b/Concep/MachineEtat.pptx
@@ -3517,7 +3517,7 @@
         </p:nvSpPr>
         <p:spPr>
           <a:xfrm>
-            <a:off x="5627979" y="2029931"/>
+            <a:off x="5243580" y="3188626"/>
             <a:ext cx="622168" cy="509047"/>
           </a:xfrm>
           <a:prstGeom prst="ellipse">
@@ -3566,7 +3566,7 @@
         <p:spPr>
           <a:xfrm>
             <a:off x="8513404" y="466019"/>
-            <a:ext cx="3367028" cy="5632311"/>
+            <a:ext cx="3367028" cy="6463308"/>
           </a:xfrm>
           <a:prstGeom prst="rect">
             <a:avLst/>
@@ -3613,9 +3613,6 @@
             <a:endParaRPr lang="fr-FR" u="sng" dirty="0"/>
           </a:p>
           <a:p>
-            <a:endParaRPr lang="fr-FR" u="sng" dirty="0"/>
-          </a:p>
-          <a:p>
             <a:endParaRPr lang="fr-FR" dirty="0"/>
           </a:p>
           <a:p>
@@ -3648,6 +3645,14 @@
             </a:r>
           </a:p>
           <a:p>
+            <a:r>
+              <a:rPr lang="fr-FR" dirty="0"/>
+              <a:t>T : </a:t>
+            </a:r>
+            <a:r>
+              <a:rPr lang="fr-FR" dirty="0" err="1"/>
+              <a:t>Timer</a:t>
+            </a:r>
             <a:endParaRPr lang="fr-FR" u="sng" dirty="0"/>
           </a:p>
           <a:p>
@@ -3686,6 +3691,31 @@
             <a:r>
               <a:rPr lang="fr-FR" dirty="0"/>
               <a:t>A4 : Annoncer Forme</a:t>
+            </a:r>
+          </a:p>
+          <a:p>
+            <a:r>
+              <a:rPr lang="fr-FR" dirty="0"/>
+              <a:t>A5 : Cliquer Forme</a:t>
+            </a:r>
+          </a:p>
+          <a:p>
+            <a:endParaRPr lang="fr-FR" u="sng" dirty="0"/>
+          </a:p>
+          <a:p>
+            <a:r>
+              <a:rPr lang="fr-FR" u="sng" dirty="0"/>
+              <a:t>Variable</a:t>
+            </a:r>
+          </a:p>
+          <a:p>
+            <a:r>
+              <a:rPr lang="fr-FR" dirty="0" err="1"/>
+              <a:t>comp</a:t>
+            </a:r>
+            <a:r>
+              <a:rPr lang="fr-FR" dirty="0"/>
+              <a:t> : Commande complète</a:t>
             </a:r>
           </a:p>
           <a:p>
@@ -3815,7 +3845,7 @@
         </p:nvSpPr>
         <p:spPr>
           <a:xfrm>
-            <a:off x="3521000" y="3926202"/>
+            <a:off x="2182130" y="4198131"/>
             <a:ext cx="622168" cy="509047"/>
           </a:xfrm>
           <a:prstGeom prst="ellipse">
@@ -3973,7 +4003,7 @@
         </p:nvSpPr>
         <p:spPr>
           <a:xfrm>
-            <a:off x="12192000" y="4674954"/>
+            <a:off x="12395011" y="4819590"/>
             <a:ext cx="2579979" cy="646331"/>
           </a:xfrm>
           <a:prstGeom prst="rect">
@@ -4260,6 +4290,503 @@
           </a:p>
         </p:txBody>
       </p:sp>
+      <p:cxnSp>
+        <p:nvCxnSpPr>
+          <p:cNvPr id="3" name="Connecteur : en arc 2">
+            <a:extLst>
+              <a:ext uri="{FF2B5EF4-FFF2-40B4-BE49-F238E27FC236}">
+                <a16:creationId xmlns:a16="http://schemas.microsoft.com/office/drawing/2014/main" id="{D272BD9F-CE4B-428D-9377-2A1D854F606F}"/>
+              </a:ext>
+            </a:extLst>
+          </p:cNvPr>
+          <p:cNvCxnSpPr>
+            <a:cxnSpLocks/>
+            <a:stCxn id="6" idx="6"/>
+            <a:endCxn id="8" idx="0"/>
+          </p:cNvCxnSpPr>
+          <p:nvPr/>
+        </p:nvCxnSpPr>
+        <p:spPr>
+          <a:xfrm>
+            <a:off x="4143168" y="2284456"/>
+            <a:ext cx="1411496" cy="904170"/>
+          </a:xfrm>
+          <a:prstGeom prst="curvedConnector2">
+            <a:avLst/>
+          </a:prstGeom>
+          <a:ln>
+            <a:tailEnd type="triangle"/>
+          </a:ln>
+        </p:spPr>
+        <p:style>
+          <a:lnRef idx="2">
+            <a:schemeClr val="dk1"/>
+          </a:lnRef>
+          <a:fillRef idx="0">
+            <a:schemeClr val="dk1"/>
+          </a:fillRef>
+          <a:effectRef idx="1">
+            <a:schemeClr val="dk1"/>
+          </a:effectRef>
+          <a:fontRef idx="minor">
+            <a:schemeClr val="tx1"/>
+          </a:fontRef>
+        </p:style>
+      </p:cxnSp>
+      <p:grpSp>
+        <p:nvGrpSpPr>
+          <p:cNvPr id="20" name="Groupe 19">
+            <a:extLst>
+              <a:ext uri="{FF2B5EF4-FFF2-40B4-BE49-F238E27FC236}">
+                <a16:creationId xmlns:a16="http://schemas.microsoft.com/office/drawing/2014/main" id="{5006EBEB-BD13-49C8-9107-6A0AE90A9C72}"/>
+              </a:ext>
+            </a:extLst>
+          </p:cNvPr>
+          <p:cNvGrpSpPr/>
+          <p:nvPr/>
+        </p:nvGrpSpPr>
+        <p:grpSpPr>
+          <a:xfrm>
+            <a:off x="4961682" y="1764194"/>
+            <a:ext cx="744435" cy="738863"/>
+            <a:chOff x="5093827" y="2075610"/>
+            <a:chExt cx="744435" cy="738863"/>
+          </a:xfrm>
+        </p:grpSpPr>
+        <p:sp>
+          <p:nvSpPr>
+            <p:cNvPr id="25" name="ZoneTexte 24">
+              <a:extLst>
+                <a:ext uri="{FF2B5EF4-FFF2-40B4-BE49-F238E27FC236}">
+                  <a16:creationId xmlns:a16="http://schemas.microsoft.com/office/drawing/2014/main" id="{A65E9E9D-61B5-4ADC-B84A-DAE70F5F0248}"/>
+                </a:ext>
+              </a:extLst>
+            </p:cNvPr>
+            <p:cNvSpPr txBox="1"/>
+            <p:nvPr/>
+          </p:nvSpPr>
+          <p:spPr>
+            <a:xfrm>
+              <a:off x="5206497" y="2075610"/>
+              <a:ext cx="512704" cy="369332"/>
+            </a:xfrm>
+            <a:prstGeom prst="rect">
+              <a:avLst/>
+            </a:prstGeom>
+            <a:noFill/>
+          </p:spPr>
+          <p:txBody>
+            <a:bodyPr wrap="none" rtlCol="0">
+              <a:spAutoFit/>
+            </a:bodyPr>
+            <a:lstStyle/>
+            <a:p>
+              <a:r>
+                <a:rPr lang="fr-FR" dirty="0"/>
+                <a:t>Ev2</a:t>
+              </a:r>
+            </a:p>
+          </p:txBody>
+        </p:sp>
+        <p:cxnSp>
+          <p:nvCxnSpPr>
+            <p:cNvPr id="26" name="Connecteur droit 25">
+              <a:extLst>
+                <a:ext uri="{FF2B5EF4-FFF2-40B4-BE49-F238E27FC236}">
+                  <a16:creationId xmlns:a16="http://schemas.microsoft.com/office/drawing/2014/main" id="{8469AB5A-C4E1-48BD-A651-A5D8711839B8}"/>
+                </a:ext>
+              </a:extLst>
+            </p:cNvPr>
+            <p:cNvCxnSpPr>
+              <a:cxnSpLocks/>
+            </p:cNvCxnSpPr>
+            <p:nvPr/>
+          </p:nvCxnSpPr>
+          <p:spPr>
+            <a:xfrm flipV="1">
+              <a:off x="5234664" y="2429171"/>
+              <a:ext cx="422763" cy="6113"/>
+            </a:xfrm>
+            <a:prstGeom prst="line">
+              <a:avLst/>
+            </a:prstGeom>
+          </p:spPr>
+          <p:style>
+            <a:lnRef idx="2">
+              <a:schemeClr val="dk1"/>
+            </a:lnRef>
+            <a:fillRef idx="0">
+              <a:schemeClr val="dk1"/>
+            </a:fillRef>
+            <a:effectRef idx="1">
+              <a:schemeClr val="dk1"/>
+            </a:effectRef>
+            <a:fontRef idx="minor">
+              <a:schemeClr val="tx1"/>
+            </a:fontRef>
+          </p:style>
+        </p:cxnSp>
+        <p:sp>
+          <p:nvSpPr>
+            <p:cNvPr id="30" name="ZoneTexte 29">
+              <a:extLst>
+                <a:ext uri="{FF2B5EF4-FFF2-40B4-BE49-F238E27FC236}">
+                  <a16:creationId xmlns:a16="http://schemas.microsoft.com/office/drawing/2014/main" id="{01779251-F854-4C37-9A17-11CC0F53592C}"/>
+                </a:ext>
+              </a:extLst>
+            </p:cNvPr>
+            <p:cNvSpPr txBox="1"/>
+            <p:nvPr/>
+          </p:nvSpPr>
+          <p:spPr>
+            <a:xfrm>
+              <a:off x="5093827" y="2445141"/>
+              <a:ext cx="744435" cy="369332"/>
+            </a:xfrm>
+            <a:prstGeom prst="rect">
+              <a:avLst/>
+            </a:prstGeom>
+            <a:noFill/>
+          </p:spPr>
+          <p:txBody>
+            <a:bodyPr wrap="none" rtlCol="0">
+              <a:spAutoFit/>
+            </a:bodyPr>
+            <a:lstStyle/>
+            <a:p>
+              <a:r>
+                <a:rPr lang="fr-FR" dirty="0"/>
+                <a:t>A3,A4</a:t>
+              </a:r>
+            </a:p>
+          </p:txBody>
+        </p:sp>
+      </p:grpSp>
+      <p:cxnSp>
+        <p:nvCxnSpPr>
+          <p:cNvPr id="15" name="Connecteur droit avec flèche 14">
+            <a:extLst>
+              <a:ext uri="{FF2B5EF4-FFF2-40B4-BE49-F238E27FC236}">
+                <a16:creationId xmlns:a16="http://schemas.microsoft.com/office/drawing/2014/main" id="{822D558C-45B1-4DDA-920B-F79C97F5B3CC}"/>
+              </a:ext>
+            </a:extLst>
+          </p:cNvPr>
+          <p:cNvCxnSpPr>
+            <a:stCxn id="6" idx="2"/>
+            <a:endCxn id="5" idx="6"/>
+          </p:cNvCxnSpPr>
+          <p:nvPr/>
+        </p:nvCxnSpPr>
+        <p:spPr>
+          <a:xfrm flipH="1">
+            <a:off x="2036189" y="2284456"/>
+            <a:ext cx="1484811" cy="0"/>
+          </a:xfrm>
+          <a:prstGeom prst="straightConnector1">
+            <a:avLst/>
+          </a:prstGeom>
+          <a:ln>
+            <a:tailEnd type="triangle"/>
+          </a:ln>
+        </p:spPr>
+        <p:style>
+          <a:lnRef idx="2">
+            <a:schemeClr val="dk1"/>
+          </a:lnRef>
+          <a:fillRef idx="0">
+            <a:schemeClr val="dk1"/>
+          </a:fillRef>
+          <a:effectRef idx="1">
+            <a:schemeClr val="dk1"/>
+          </a:effectRef>
+          <a:fontRef idx="minor">
+            <a:schemeClr val="tx1"/>
+          </a:fontRef>
+        </p:style>
+      </p:cxnSp>
+      <p:sp>
+        <p:nvSpPr>
+          <p:cNvPr id="16" name="ZoneTexte 15">
+            <a:extLst>
+              <a:ext uri="{FF2B5EF4-FFF2-40B4-BE49-F238E27FC236}">
+                <a16:creationId xmlns:a16="http://schemas.microsoft.com/office/drawing/2014/main" id="{86D7B8ED-A884-4B21-AE65-2855F14FBD5B}"/>
+              </a:ext>
+            </a:extLst>
+          </p:cNvPr>
+          <p:cNvSpPr txBox="1"/>
+          <p:nvPr/>
+        </p:nvSpPr>
+        <p:spPr>
+          <a:xfrm>
+            <a:off x="2493214" y="1948960"/>
+            <a:ext cx="724878" cy="369332"/>
+          </a:xfrm>
+          <a:prstGeom prst="rect">
+            <a:avLst/>
+          </a:prstGeom>
+          <a:noFill/>
+        </p:spPr>
+        <p:txBody>
+          <a:bodyPr wrap="none" rtlCol="0">
+            <a:spAutoFit/>
+          </a:bodyPr>
+          <a:lstStyle/>
+          <a:p>
+            <a:r>
+              <a:rPr lang="fr-FR" dirty="0"/>
+              <a:t>T &lt; 2s</a:t>
+            </a:r>
+          </a:p>
+        </p:txBody>
+      </p:sp>
+      <p:cxnSp>
+        <p:nvCxnSpPr>
+          <p:cNvPr id="24" name="Connecteur droit avec flèche 23">
+            <a:extLst>
+              <a:ext uri="{FF2B5EF4-FFF2-40B4-BE49-F238E27FC236}">
+                <a16:creationId xmlns:a16="http://schemas.microsoft.com/office/drawing/2014/main" id="{89FE6CE7-8683-4A35-8F2C-D02B32E0EE04}"/>
+              </a:ext>
+            </a:extLst>
+          </p:cNvPr>
+          <p:cNvCxnSpPr>
+            <a:stCxn id="8" idx="1"/>
+            <a:endCxn id="6" idx="5"/>
+          </p:cNvCxnSpPr>
+          <p:nvPr/>
+        </p:nvCxnSpPr>
+        <p:spPr>
+          <a:xfrm flipH="1" flipV="1">
+            <a:off x="4052054" y="2464431"/>
+            <a:ext cx="1282640" cy="798743"/>
+          </a:xfrm>
+          <a:prstGeom prst="straightConnector1">
+            <a:avLst/>
+          </a:prstGeom>
+          <a:ln>
+            <a:tailEnd type="triangle"/>
+          </a:ln>
+        </p:spPr>
+        <p:style>
+          <a:lnRef idx="2">
+            <a:schemeClr val="dk1"/>
+          </a:lnRef>
+          <a:fillRef idx="0">
+            <a:schemeClr val="dk1"/>
+          </a:fillRef>
+          <a:effectRef idx="1">
+            <a:schemeClr val="dk1"/>
+          </a:effectRef>
+          <a:fontRef idx="minor">
+            <a:schemeClr val="tx1"/>
+          </a:fontRef>
+        </p:style>
+      </p:cxnSp>
+      <p:sp>
+        <p:nvSpPr>
+          <p:cNvPr id="38" name="ZoneTexte 37">
+            <a:extLst>
+              <a:ext uri="{FF2B5EF4-FFF2-40B4-BE49-F238E27FC236}">
+                <a16:creationId xmlns:a16="http://schemas.microsoft.com/office/drawing/2014/main" id="{82430E43-9CBA-4B5F-ACF6-658F1CE19EAE}"/>
+              </a:ext>
+            </a:extLst>
+          </p:cNvPr>
+          <p:cNvSpPr txBox="1"/>
+          <p:nvPr/>
+        </p:nvSpPr>
+        <p:spPr>
+          <a:xfrm rot="1930817">
+            <a:off x="4462301" y="2597105"/>
+            <a:ext cx="724878" cy="369332"/>
+          </a:xfrm>
+          <a:prstGeom prst="rect">
+            <a:avLst/>
+          </a:prstGeom>
+          <a:noFill/>
+        </p:spPr>
+        <p:txBody>
+          <a:bodyPr wrap="none" rtlCol="0">
+            <a:spAutoFit/>
+          </a:bodyPr>
+          <a:lstStyle/>
+          <a:p>
+            <a:r>
+              <a:rPr lang="fr-FR" dirty="0"/>
+              <a:t>T &lt; 1s</a:t>
+            </a:r>
+          </a:p>
+        </p:txBody>
+      </p:sp>
+      <p:cxnSp>
+        <p:nvCxnSpPr>
+          <p:cNvPr id="43" name="Connecteur : en arc 42">
+            <a:extLst>
+              <a:ext uri="{FF2B5EF4-FFF2-40B4-BE49-F238E27FC236}">
+                <a16:creationId xmlns:a16="http://schemas.microsoft.com/office/drawing/2014/main" id="{5AB54E10-9C71-467A-BD42-7080E659CC97}"/>
+              </a:ext>
+            </a:extLst>
+          </p:cNvPr>
+          <p:cNvCxnSpPr>
+            <a:cxnSpLocks/>
+            <a:endCxn id="6" idx="4"/>
+          </p:cNvCxnSpPr>
+          <p:nvPr/>
+        </p:nvCxnSpPr>
+        <p:spPr>
+          <a:xfrm rot="10800000">
+            <a:off x="3832085" y="2538980"/>
+            <a:ext cx="1397769" cy="952073"/>
+          </a:xfrm>
+          <a:prstGeom prst="curvedConnector2">
+            <a:avLst/>
+          </a:prstGeom>
+          <a:ln>
+            <a:tailEnd type="triangle"/>
+          </a:ln>
+        </p:spPr>
+        <p:style>
+          <a:lnRef idx="2">
+            <a:schemeClr val="dk1"/>
+          </a:lnRef>
+          <a:fillRef idx="0">
+            <a:schemeClr val="dk1"/>
+          </a:fillRef>
+          <a:effectRef idx="1">
+            <a:schemeClr val="dk1"/>
+          </a:effectRef>
+          <a:fontRef idx="minor">
+            <a:schemeClr val="tx1"/>
+          </a:fontRef>
+        </p:style>
+      </p:cxnSp>
+      <p:grpSp>
+        <p:nvGrpSpPr>
+          <p:cNvPr id="46" name="Groupe 45">
+            <a:extLst>
+              <a:ext uri="{FF2B5EF4-FFF2-40B4-BE49-F238E27FC236}">
+                <a16:creationId xmlns:a16="http://schemas.microsoft.com/office/drawing/2014/main" id="{E40AEE8A-B075-4213-BC26-B44CAC07D28C}"/>
+              </a:ext>
+            </a:extLst>
+          </p:cNvPr>
+          <p:cNvGrpSpPr/>
+          <p:nvPr/>
+        </p:nvGrpSpPr>
+        <p:grpSpPr>
+          <a:xfrm>
+            <a:off x="3929538" y="3179145"/>
+            <a:ext cx="512704" cy="738664"/>
+            <a:chOff x="5206497" y="2075610"/>
+            <a:chExt cx="512704" cy="738664"/>
+          </a:xfrm>
+        </p:grpSpPr>
+        <p:sp>
+          <p:nvSpPr>
+            <p:cNvPr id="47" name="ZoneTexte 46">
+              <a:extLst>
+                <a:ext uri="{FF2B5EF4-FFF2-40B4-BE49-F238E27FC236}">
+                  <a16:creationId xmlns:a16="http://schemas.microsoft.com/office/drawing/2014/main" id="{7AE0D6AF-EA40-4E70-A50D-3B227C066B2E}"/>
+                </a:ext>
+              </a:extLst>
+            </p:cNvPr>
+            <p:cNvSpPr txBox="1"/>
+            <p:nvPr/>
+          </p:nvSpPr>
+          <p:spPr>
+            <a:xfrm>
+              <a:off x="5206497" y="2075610"/>
+              <a:ext cx="512704" cy="369332"/>
+            </a:xfrm>
+            <a:prstGeom prst="rect">
+              <a:avLst/>
+            </a:prstGeom>
+            <a:noFill/>
+          </p:spPr>
+          <p:txBody>
+            <a:bodyPr wrap="none" rtlCol="0">
+              <a:spAutoFit/>
+            </a:bodyPr>
+            <a:lstStyle/>
+            <a:p>
+              <a:r>
+                <a:rPr lang="fr-FR" dirty="0"/>
+                <a:t>Ev3</a:t>
+              </a:r>
+            </a:p>
+          </p:txBody>
+        </p:sp>
+        <p:cxnSp>
+          <p:nvCxnSpPr>
+            <p:cNvPr id="48" name="Connecteur droit 47">
+              <a:extLst>
+                <a:ext uri="{FF2B5EF4-FFF2-40B4-BE49-F238E27FC236}">
+                  <a16:creationId xmlns:a16="http://schemas.microsoft.com/office/drawing/2014/main" id="{F81362E9-970F-46FA-A4D0-D464D30A0E21}"/>
+                </a:ext>
+              </a:extLst>
+            </p:cNvPr>
+            <p:cNvCxnSpPr>
+              <a:cxnSpLocks/>
+            </p:cNvCxnSpPr>
+            <p:nvPr/>
+          </p:nvCxnSpPr>
+          <p:spPr>
+            <a:xfrm flipV="1">
+              <a:off x="5234664" y="2429171"/>
+              <a:ext cx="422763" cy="6113"/>
+            </a:xfrm>
+            <a:prstGeom prst="line">
+              <a:avLst/>
+            </a:prstGeom>
+          </p:spPr>
+          <p:style>
+            <a:lnRef idx="2">
+              <a:schemeClr val="dk1"/>
+            </a:lnRef>
+            <a:fillRef idx="0">
+              <a:schemeClr val="dk1"/>
+            </a:fillRef>
+            <a:effectRef idx="1">
+              <a:schemeClr val="dk1"/>
+            </a:effectRef>
+            <a:fontRef idx="minor">
+              <a:schemeClr val="tx1"/>
+            </a:fontRef>
+          </p:style>
+        </p:cxnSp>
+        <p:sp>
+          <p:nvSpPr>
+            <p:cNvPr id="49" name="ZoneTexte 48">
+              <a:extLst>
+                <a:ext uri="{FF2B5EF4-FFF2-40B4-BE49-F238E27FC236}">
+                  <a16:creationId xmlns:a16="http://schemas.microsoft.com/office/drawing/2014/main" id="{51435C5C-AD65-4447-9294-A4DF9BC1B0C3}"/>
+                </a:ext>
+              </a:extLst>
+            </p:cNvPr>
+            <p:cNvSpPr txBox="1"/>
+            <p:nvPr/>
+          </p:nvSpPr>
+          <p:spPr>
+            <a:xfrm>
+              <a:off x="5237236" y="2444942"/>
+              <a:ext cx="434734" cy="369332"/>
+            </a:xfrm>
+            <a:prstGeom prst="rect">
+              <a:avLst/>
+            </a:prstGeom>
+            <a:noFill/>
+          </p:spPr>
+          <p:txBody>
+            <a:bodyPr wrap="none" rtlCol="0">
+              <a:spAutoFit/>
+            </a:bodyPr>
+            <a:lstStyle/>
+            <a:p>
+              <a:r>
+                <a:rPr lang="fr-FR" dirty="0"/>
+                <a:t>A5</a:t>
+              </a:r>
+            </a:p>
+          </p:txBody>
+        </p:sp>
+      </p:grpSp>
     </p:spTree>
     <p:extLst>
       <p:ext uri="{BB962C8B-B14F-4D97-AF65-F5344CB8AC3E}">

</xml_diff>

<commit_message>
modif geste Deplacer + fin machine état
</commit_message>
<xml_diff>
--- a/Concep/MachineEtat.pptx
+++ b/Concep/MachineEtat.pptx
@@ -261,7 +261,7 @@
           <a:p>
             <a:fld id="{F4A82166-679B-4DCA-B2EB-D3A018EE558C}" type="datetimeFigureOut">
               <a:rPr lang="fr-FR" smtClean="0"/>
-              <a:t>21/11/2019</a:t>
+              <a:t>22/11/2019</a:t>
             </a:fld>
             <a:endParaRPr lang="fr-FR"/>
           </a:p>
@@ -459,7 +459,7 @@
           <a:p>
             <a:fld id="{F4A82166-679B-4DCA-B2EB-D3A018EE558C}" type="datetimeFigureOut">
               <a:rPr lang="fr-FR" smtClean="0"/>
-              <a:t>21/11/2019</a:t>
+              <a:t>22/11/2019</a:t>
             </a:fld>
             <a:endParaRPr lang="fr-FR"/>
           </a:p>
@@ -667,7 +667,7 @@
           <a:p>
             <a:fld id="{F4A82166-679B-4DCA-B2EB-D3A018EE558C}" type="datetimeFigureOut">
               <a:rPr lang="fr-FR" smtClean="0"/>
-              <a:t>21/11/2019</a:t>
+              <a:t>22/11/2019</a:t>
             </a:fld>
             <a:endParaRPr lang="fr-FR"/>
           </a:p>
@@ -865,7 +865,7 @@
           <a:p>
             <a:fld id="{F4A82166-679B-4DCA-B2EB-D3A018EE558C}" type="datetimeFigureOut">
               <a:rPr lang="fr-FR" smtClean="0"/>
-              <a:t>21/11/2019</a:t>
+              <a:t>22/11/2019</a:t>
             </a:fld>
             <a:endParaRPr lang="fr-FR"/>
           </a:p>
@@ -1140,7 +1140,7 @@
           <a:p>
             <a:fld id="{F4A82166-679B-4DCA-B2EB-D3A018EE558C}" type="datetimeFigureOut">
               <a:rPr lang="fr-FR" smtClean="0"/>
-              <a:t>21/11/2019</a:t>
+              <a:t>22/11/2019</a:t>
             </a:fld>
             <a:endParaRPr lang="fr-FR"/>
           </a:p>
@@ -1405,7 +1405,7 @@
           <a:p>
             <a:fld id="{F4A82166-679B-4DCA-B2EB-D3A018EE558C}" type="datetimeFigureOut">
               <a:rPr lang="fr-FR" smtClean="0"/>
-              <a:t>21/11/2019</a:t>
+              <a:t>22/11/2019</a:t>
             </a:fld>
             <a:endParaRPr lang="fr-FR"/>
           </a:p>
@@ -1817,7 +1817,7 @@
           <a:p>
             <a:fld id="{F4A82166-679B-4DCA-B2EB-D3A018EE558C}" type="datetimeFigureOut">
               <a:rPr lang="fr-FR" smtClean="0"/>
-              <a:t>21/11/2019</a:t>
+              <a:t>22/11/2019</a:t>
             </a:fld>
             <a:endParaRPr lang="fr-FR"/>
           </a:p>
@@ -1958,7 +1958,7 @@
           <a:p>
             <a:fld id="{F4A82166-679B-4DCA-B2EB-D3A018EE558C}" type="datetimeFigureOut">
               <a:rPr lang="fr-FR" smtClean="0"/>
-              <a:t>21/11/2019</a:t>
+              <a:t>22/11/2019</a:t>
             </a:fld>
             <a:endParaRPr lang="fr-FR"/>
           </a:p>
@@ -2071,7 +2071,7 @@
           <a:p>
             <a:fld id="{F4A82166-679B-4DCA-B2EB-D3A018EE558C}" type="datetimeFigureOut">
               <a:rPr lang="fr-FR" smtClean="0"/>
-              <a:t>21/11/2019</a:t>
+              <a:t>22/11/2019</a:t>
             </a:fld>
             <a:endParaRPr lang="fr-FR"/>
           </a:p>
@@ -2382,7 +2382,7 @@
           <a:p>
             <a:fld id="{F4A82166-679B-4DCA-B2EB-D3A018EE558C}" type="datetimeFigureOut">
               <a:rPr lang="fr-FR" smtClean="0"/>
-              <a:t>21/11/2019</a:t>
+              <a:t>22/11/2019</a:t>
             </a:fld>
             <a:endParaRPr lang="fr-FR"/>
           </a:p>
@@ -2670,7 +2670,7 @@
           <a:p>
             <a:fld id="{F4A82166-679B-4DCA-B2EB-D3A018EE558C}" type="datetimeFigureOut">
               <a:rPr lang="fr-FR" smtClean="0"/>
-              <a:t>21/11/2019</a:t>
+              <a:t>22/11/2019</a:t>
             </a:fld>
             <a:endParaRPr lang="fr-FR"/>
           </a:p>
@@ -2911,7 +2911,7 @@
           <a:p>
             <a:fld id="{F4A82166-679B-4DCA-B2EB-D3A018EE558C}" type="datetimeFigureOut">
               <a:rPr lang="fr-FR" smtClean="0"/>
-              <a:t>21/11/2019</a:t>
+              <a:t>22/11/2019</a:t>
             </a:fld>
             <a:endParaRPr lang="fr-FR"/>
           </a:p>
@@ -3330,41 +3330,6 @@
       </p:grpSpPr>
       <p:sp>
         <p:nvSpPr>
-          <p:cNvPr id="4" name="ZoneTexte 3">
-            <a:extLst>
-              <a:ext uri="{FF2B5EF4-FFF2-40B4-BE49-F238E27FC236}">
-                <a16:creationId xmlns:a16="http://schemas.microsoft.com/office/drawing/2014/main" id="{D696518F-AFBF-4D05-95B9-DBB5152EAF65}"/>
-              </a:ext>
-            </a:extLst>
-          </p:cNvPr>
-          <p:cNvSpPr txBox="1"/>
-          <p:nvPr/>
-        </p:nvSpPr>
-        <p:spPr>
-          <a:xfrm>
-            <a:off x="895546" y="273377"/>
-            <a:ext cx="1238416" cy="369332"/>
-          </a:xfrm>
-          <a:prstGeom prst="rect">
-            <a:avLst/>
-          </a:prstGeom>
-          <a:noFill/>
-        </p:spPr>
-        <p:txBody>
-          <a:bodyPr wrap="none" rtlCol="0">
-            <a:spAutoFit/>
-          </a:bodyPr>
-          <a:lstStyle/>
-          <a:p>
-            <a:r>
-              <a:rPr lang="fr-FR" dirty="0"/>
-              <a:t>Créer objet</a:t>
-            </a:r>
-          </a:p>
-        </p:txBody>
-      </p:sp>
-      <p:sp>
-        <p:nvSpPr>
           <p:cNvPr id="5" name="Ellipse 4">
             <a:extLst>
               <a:ext uri="{FF2B5EF4-FFF2-40B4-BE49-F238E27FC236}">
@@ -3517,7 +3482,7 @@
         </p:nvSpPr>
         <p:spPr>
           <a:xfrm>
-            <a:off x="5243580" y="3188626"/>
+            <a:off x="5587056" y="2760493"/>
             <a:ext cx="622168" cy="509047"/>
           </a:xfrm>
           <a:prstGeom prst="ellipse">
@@ -3565,8 +3530,8 @@
         </p:nvSpPr>
         <p:spPr>
           <a:xfrm>
-            <a:off x="8513404" y="466019"/>
-            <a:ext cx="3367028" cy="6463308"/>
+            <a:off x="8361365" y="460587"/>
+            <a:ext cx="3367028" cy="5909310"/>
           </a:xfrm>
           <a:prstGeom prst="rect">
             <a:avLst/>
@@ -3594,21 +3559,25 @@
           <a:p>
             <a:r>
               <a:rPr lang="fr-FR" dirty="0"/>
-              <a:t>E1 : En cours de création</a:t>
+              <a:t>E1 : En cours d’</a:t>
+            </a:r>
+            <a:r>
+              <a:rPr lang="fr-FR" dirty="0" err="1"/>
+              <a:t>éxécution</a:t>
             </a:r>
             <a:endParaRPr lang="fr-FR" u="sng" dirty="0"/>
           </a:p>
           <a:p>
             <a:r>
               <a:rPr lang="fr-FR" dirty="0"/>
-              <a:t>E2 : Attente clic validation</a:t>
+              <a:t>E2 : Attente validation clic</a:t>
             </a:r>
             <a:endParaRPr lang="fr-FR" u="sng" dirty="0"/>
           </a:p>
           <a:p>
             <a:r>
               <a:rPr lang="fr-FR" dirty="0"/>
-              <a:t>E3 : Attente parole validation</a:t>
+              <a:t>E3 : Attente info parole pour validation</a:t>
             </a:r>
             <a:endParaRPr lang="fr-FR" u="sng" dirty="0"/>
           </a:p>
@@ -3624,24 +3593,23 @@
           <a:p>
             <a:r>
               <a:rPr lang="fr-FR" dirty="0"/>
-              <a:t>Ev1 : 1$</a:t>
-            </a:r>
-          </a:p>
-          <a:p>
-            <a:r>
-              <a:rPr lang="fr-FR" dirty="0"/>
-              <a:t>Ev2 : </a:t>
-            </a:r>
+              <a:t>1$ : geste</a:t>
+            </a:r>
+          </a:p>
+          <a:p>
             <a:r>
               <a:rPr lang="fr-FR" dirty="0" err="1"/>
               <a:t>sra</a:t>
             </a:r>
-            <a:endParaRPr lang="fr-FR" dirty="0"/>
-          </a:p>
-          <a:p>
             <a:r>
               <a:rPr lang="fr-FR" dirty="0"/>
-              <a:t>Ev3 : Palette</a:t>
+              <a:t> : parole</a:t>
+            </a:r>
+          </a:p>
+          <a:p>
+            <a:r>
+              <a:rPr lang="fr-FR" dirty="0"/>
+              <a:t>Palette : clic</a:t>
             </a:r>
           </a:p>
           <a:p>
@@ -3665,38 +3633,12 @@
             </a:r>
           </a:p>
           <a:p>
+            <a:endParaRPr lang="fr-FR" dirty="0"/>
+          </a:p>
+          <a:p>
             <a:r>
               <a:rPr lang="fr-FR" dirty="0"/>
-              <a:t>A1 : Dessiner Rectangle</a:t>
-            </a:r>
-            <a:endParaRPr lang="fr-FR" u="sng" dirty="0"/>
-          </a:p>
-          <a:p>
-            <a:r>
-              <a:rPr lang="fr-FR" dirty="0"/>
-              <a:t>A2 : Dessiner Ellipse</a:t>
-            </a:r>
-          </a:p>
-          <a:p>
-            <a:endParaRPr lang="fr-FR" u="sng" dirty="0"/>
-          </a:p>
-          <a:p>
-            <a:r>
-              <a:rPr lang="fr-FR" dirty="0"/>
-              <a:t>A3 : Annoncer Couleur</a:t>
-            </a:r>
-            <a:endParaRPr lang="fr-FR" u="sng" dirty="0"/>
-          </a:p>
-          <a:p>
-            <a:r>
-              <a:rPr lang="fr-FR" dirty="0"/>
-              <a:t>A4 : Annoncer Forme</a:t>
-            </a:r>
-          </a:p>
-          <a:p>
-            <a:r>
-              <a:rPr lang="fr-FR" dirty="0"/>
-              <a:t>A5 : Cliquer Forme</a:t>
+              <a:t>A1 : Exécuter commande</a:t>
             </a:r>
           </a:p>
           <a:p>
@@ -3715,7 +3657,15 @@
             </a:r>
             <a:r>
               <a:rPr lang="fr-FR" dirty="0"/>
-              <a:t> : Commande complète</a:t>
+              <a:t> </a:t>
+            </a:r>
+            <a:r>
+              <a:rPr lang="fr-FR"/>
+              <a:t>: Boolean Commande </a:t>
+            </a:r>
+            <a:r>
+              <a:rPr lang="fr-FR" dirty="0"/>
+              <a:t>complète</a:t>
             </a:r>
           </a:p>
           <a:p>
@@ -3738,7 +3688,7 @@
         <p:spPr>
           <a:xfrm>
             <a:off x="12671469" y="984399"/>
-            <a:ext cx="512704" cy="369332"/>
+            <a:ext cx="839589" cy="369332"/>
           </a:xfrm>
           <a:prstGeom prst="rect">
             <a:avLst/>
@@ -3753,7 +3703,7 @@
           <a:p>
             <a:r>
               <a:rPr lang="fr-FR" dirty="0"/>
-              <a:t>Ev3</a:t>
+              <a:t>Palette</a:t>
             </a:r>
           </a:p>
         </p:txBody>
@@ -3845,7 +3795,7 @@
         </p:nvSpPr>
         <p:spPr>
           <a:xfrm>
-            <a:off x="2182130" y="4198131"/>
+            <a:off x="3014136" y="3493973"/>
             <a:ext cx="622168" cy="509047"/>
           </a:xfrm>
           <a:prstGeom prst="ellipse">
@@ -3908,14 +3858,14 @@
           <a:p>
             <a:r>
               <a:rPr lang="fr-FR" dirty="0"/>
-              <a:t>Ev1.1 : Dessiner Créer Ellipse</a:t>
+              <a:t>1$.1 : Dessiner Créer Ellipse</a:t>
             </a:r>
             <a:endParaRPr lang="fr-FR" u="sng" dirty="0"/>
           </a:p>
           <a:p>
             <a:r>
               <a:rPr lang="fr-FR" dirty="0"/>
-              <a:t>Ev1.2 : Dessiner Créer Rectangle</a:t>
+              <a:t>1$.2 : Dessiner Créer Rectangle</a:t>
             </a:r>
           </a:p>
           <a:p>
@@ -3924,21 +3874,21 @@
           <a:p>
             <a:r>
               <a:rPr lang="fr-FR" dirty="0"/>
-              <a:t>Ev2.1 : Annoncer Forme</a:t>
+              <a:t>sra.1 : Annoncer Forme</a:t>
             </a:r>
             <a:endParaRPr lang="fr-FR" u="sng" dirty="0"/>
           </a:p>
           <a:p>
             <a:r>
               <a:rPr lang="fr-FR" dirty="0"/>
-              <a:t>Ev2.2.1 : Annoncer Couleur</a:t>
+              <a:t>sra.2.1 : Annoncer Couleur</a:t>
             </a:r>
             <a:endParaRPr lang="fr-FR" u="sng" dirty="0"/>
           </a:p>
           <a:p>
             <a:r>
               <a:rPr lang="fr-FR" dirty="0"/>
-              <a:t>Ev2.2.2 : Annoncer Copie Couleur</a:t>
+              <a:t>sra.2.2 : Annoncer Copie Couleur</a:t>
             </a:r>
             <a:endParaRPr lang="fr-FR" u="sng" dirty="0"/>
           </a:p>
@@ -3991,47 +3941,6 @@
       </p:cxnSp>
       <p:sp>
         <p:nvSpPr>
-          <p:cNvPr id="23" name="Rectangle 22">
-            <a:extLst>
-              <a:ext uri="{FF2B5EF4-FFF2-40B4-BE49-F238E27FC236}">
-                <a16:creationId xmlns:a16="http://schemas.microsoft.com/office/drawing/2014/main" id="{5155A4CC-43A4-45FE-B2AE-578BFCA93E55}"/>
-              </a:ext>
-            </a:extLst>
-          </p:cNvPr>
-          <p:cNvSpPr/>
-          <p:nvPr/>
-        </p:nvSpPr>
-        <p:spPr>
-          <a:xfrm>
-            <a:off x="12395011" y="4819590"/>
-            <a:ext cx="2579979" cy="646331"/>
-          </a:xfrm>
-          <a:prstGeom prst="rect">
-            <a:avLst/>
-          </a:prstGeom>
-        </p:spPr>
-        <p:txBody>
-          <a:bodyPr wrap="square">
-            <a:spAutoFit/>
-          </a:bodyPr>
-          <a:lstStyle/>
-          <a:p>
-            <a:r>
-              <a:rPr lang="fr-FR" dirty="0"/>
-              <a:t>Ax : Dessiner Déplacer</a:t>
-            </a:r>
-            <a:endParaRPr lang="fr-FR" u="sng" dirty="0"/>
-          </a:p>
-          <a:p>
-            <a:r>
-              <a:rPr lang="fr-FR" dirty="0"/>
-              <a:t>Ax : Dessiner Supprimer</a:t>
-            </a:r>
-          </a:p>
-        </p:txBody>
-      </p:sp>
-      <p:sp>
-        <p:nvSpPr>
           <p:cNvPr id="27" name="ZoneTexte 26">
             <a:extLst>
               <a:ext uri="{FF2B5EF4-FFF2-40B4-BE49-F238E27FC236}">
@@ -4044,8 +3953,8 @@
         </p:nvSpPr>
         <p:spPr>
           <a:xfrm>
-            <a:off x="2362441" y="1041741"/>
-            <a:ext cx="512704" cy="369332"/>
+            <a:off x="2569242" y="1454144"/>
+            <a:ext cx="418704" cy="369332"/>
           </a:xfrm>
           <a:prstGeom prst="rect">
             <a:avLst/>
@@ -4060,33 +3969,39 @@
           <a:p>
             <a:r>
               <a:rPr lang="fr-FR" dirty="0"/>
-              <a:t>Ev1</a:t>
+              <a:t>1$</a:t>
             </a:r>
           </a:p>
         </p:txBody>
       </p:sp>
       <p:cxnSp>
         <p:nvCxnSpPr>
-          <p:cNvPr id="28" name="Connecteur droit 27">
-            <a:extLst>
-              <a:ext uri="{FF2B5EF4-FFF2-40B4-BE49-F238E27FC236}">
-                <a16:creationId xmlns:a16="http://schemas.microsoft.com/office/drawing/2014/main" id="{63727C58-5F1D-4E28-8DF2-1AC341505F2B}"/>
+          <p:cNvPr id="31" name="Connecteur : en arc 30">
+            <a:extLst>
+              <a:ext uri="{FF2B5EF4-FFF2-40B4-BE49-F238E27FC236}">
+                <a16:creationId xmlns:a16="http://schemas.microsoft.com/office/drawing/2014/main" id="{D25A4ABB-FB4B-4CE7-BE0A-B677C6963F17}"/>
               </a:ext>
             </a:extLst>
           </p:cNvPr>
           <p:cNvCxnSpPr>
-            <a:cxnSpLocks/>
+            <a:stCxn id="6" idx="0"/>
+            <a:endCxn id="6" idx="7"/>
           </p:cNvCxnSpPr>
           <p:nvPr/>
         </p:nvCxnSpPr>
         <p:spPr>
-          <a:xfrm>
-            <a:off x="2289570" y="1404960"/>
-            <a:ext cx="658447" cy="0"/>
-          </a:xfrm>
-          <a:prstGeom prst="line">
-            <a:avLst/>
+          <a:xfrm rot="16200000" flipH="1">
+            <a:off x="3904795" y="1957221"/>
+            <a:ext cx="74548" cy="219970"/>
+          </a:xfrm>
+          <a:prstGeom prst="curvedConnector3">
+            <a:avLst>
+              <a:gd name="adj1" fmla="val -538338"/>
+            </a:avLst>
           </a:prstGeom>
+          <a:ln>
+            <a:tailEnd type="triangle"/>
+          </a:ln>
         </p:spPr>
         <p:style>
           <a:lnRef idx="2">
@@ -4105,10 +4020,10 @@
       </p:cxnSp>
       <p:sp>
         <p:nvSpPr>
-          <p:cNvPr id="29" name="ZoneTexte 28">
-            <a:extLst>
-              <a:ext uri="{FF2B5EF4-FFF2-40B4-BE49-F238E27FC236}">
-                <a16:creationId xmlns:a16="http://schemas.microsoft.com/office/drawing/2014/main" id="{DA6FB778-4590-47DC-B9D5-4B56A58FB1A5}"/>
+          <p:cNvPr id="35" name="ZoneTexte 34">
+            <a:extLst>
+              <a:ext uri="{FF2B5EF4-FFF2-40B4-BE49-F238E27FC236}">
+                <a16:creationId xmlns:a16="http://schemas.microsoft.com/office/drawing/2014/main" id="{22B233F2-259C-4BBF-A57C-8E98F22B208B}"/>
               </a:ext>
             </a:extLst>
           </p:cNvPr>
@@ -4117,8 +4032,8 @@
         </p:nvSpPr>
         <p:spPr>
           <a:xfrm>
-            <a:off x="2246575" y="1398848"/>
-            <a:ext cx="744435" cy="369332"/>
+            <a:off x="3711845" y="1276201"/>
+            <a:ext cx="460447" cy="369332"/>
           </a:xfrm>
           <a:prstGeom prst="rect">
             <a:avLst/>
@@ -4132,36 +4047,36 @@
           <a:lstStyle/>
           <a:p>
             <a:r>
-              <a:rPr lang="fr-FR" dirty="0"/>
-              <a:t>A1,A2</a:t>
-            </a:r>
+              <a:rPr lang="fr-FR" dirty="0" err="1"/>
+              <a:t>sra</a:t>
+            </a:r>
+            <a:endParaRPr lang="fr-FR" dirty="0"/>
           </a:p>
         </p:txBody>
       </p:sp>
       <p:cxnSp>
         <p:nvCxnSpPr>
-          <p:cNvPr id="31" name="Connecteur : en arc 30">
-            <a:extLst>
-              <a:ext uri="{FF2B5EF4-FFF2-40B4-BE49-F238E27FC236}">
-                <a16:creationId xmlns:a16="http://schemas.microsoft.com/office/drawing/2014/main" id="{D25A4ABB-FB4B-4CE7-BE0A-B677C6963F17}"/>
+          <p:cNvPr id="3" name="Connecteur : en arc 2">
+            <a:extLst>
+              <a:ext uri="{FF2B5EF4-FFF2-40B4-BE49-F238E27FC236}">
+                <a16:creationId xmlns:a16="http://schemas.microsoft.com/office/drawing/2014/main" id="{D272BD9F-CE4B-428D-9377-2A1D854F606F}"/>
               </a:ext>
             </a:extLst>
           </p:cNvPr>
           <p:cNvCxnSpPr>
-            <a:stCxn id="6" idx="0"/>
-            <a:endCxn id="6" idx="7"/>
+            <a:cxnSpLocks/>
+            <a:stCxn id="6" idx="6"/>
+            <a:endCxn id="8" idx="0"/>
           </p:cNvCxnSpPr>
           <p:nvPr/>
         </p:nvCxnSpPr>
         <p:spPr>
-          <a:xfrm rot="16200000" flipH="1">
-            <a:off x="3904795" y="1957221"/>
-            <a:ext cx="74548" cy="219970"/>
-          </a:xfrm>
-          <a:prstGeom prst="curvedConnector3">
-            <a:avLst>
-              <a:gd name="adj1" fmla="val -538338"/>
-            </a:avLst>
+          <a:xfrm>
+            <a:off x="4143168" y="2284456"/>
+            <a:ext cx="1754972" cy="476037"/>
+          </a:xfrm>
+          <a:prstGeom prst="curvedConnector2">
+            <a:avLst/>
           </a:prstGeom>
           <a:ln>
             <a:tailEnd type="triangle"/>
@@ -4184,10 +4099,10 @@
       </p:cxnSp>
       <p:sp>
         <p:nvSpPr>
-          <p:cNvPr id="35" name="ZoneTexte 34">
-            <a:extLst>
-              <a:ext uri="{FF2B5EF4-FFF2-40B4-BE49-F238E27FC236}">
-                <a16:creationId xmlns:a16="http://schemas.microsoft.com/office/drawing/2014/main" id="{22B233F2-259C-4BBF-A57C-8E98F22B208B}"/>
+          <p:cNvPr id="25" name="ZoneTexte 24">
+            <a:extLst>
+              <a:ext uri="{FF2B5EF4-FFF2-40B4-BE49-F238E27FC236}">
+                <a16:creationId xmlns:a16="http://schemas.microsoft.com/office/drawing/2014/main" id="{A65E9E9D-61B5-4ADC-B84A-DAE70F5F0248}"/>
               </a:ext>
             </a:extLst>
           </p:cNvPr>
@@ -4196,8 +4111,8 @@
         </p:nvSpPr>
         <p:spPr>
           <a:xfrm>
-            <a:off x="3575732" y="924467"/>
-            <a:ext cx="512704" cy="369332"/>
+            <a:off x="4992438" y="1913355"/>
+            <a:ext cx="460447" cy="369332"/>
           </a:xfrm>
           <a:prstGeom prst="rect">
             <a:avLst/>
@@ -4211,34 +4126,39 @@
           <a:lstStyle/>
           <a:p>
             <a:r>
-              <a:rPr lang="fr-FR" dirty="0"/>
-              <a:t>Ev2</a:t>
-            </a:r>
+              <a:rPr lang="fr-FR" dirty="0" err="1"/>
+              <a:t>sra</a:t>
+            </a:r>
+            <a:endParaRPr lang="fr-FR" dirty="0"/>
           </a:p>
         </p:txBody>
       </p:sp>
       <p:cxnSp>
         <p:nvCxnSpPr>
-          <p:cNvPr id="36" name="Connecteur droit 35">
-            <a:extLst>
-              <a:ext uri="{FF2B5EF4-FFF2-40B4-BE49-F238E27FC236}">
-                <a16:creationId xmlns:a16="http://schemas.microsoft.com/office/drawing/2014/main" id="{321EB2A1-9120-461D-9D64-77CED388A62E}"/>
+          <p:cNvPr id="15" name="Connecteur droit avec flèche 14">
+            <a:extLst>
+              <a:ext uri="{FF2B5EF4-FFF2-40B4-BE49-F238E27FC236}">
+                <a16:creationId xmlns:a16="http://schemas.microsoft.com/office/drawing/2014/main" id="{822D558C-45B1-4DDA-920B-F79C97F5B3CC}"/>
               </a:ext>
             </a:extLst>
           </p:cNvPr>
           <p:cNvCxnSpPr>
-            <a:cxnSpLocks/>
+            <a:stCxn id="6" idx="2"/>
+            <a:endCxn id="5" idx="6"/>
           </p:cNvCxnSpPr>
           <p:nvPr/>
         </p:nvCxnSpPr>
         <p:spPr>
-          <a:xfrm flipV="1">
-            <a:off x="3636915" y="1293800"/>
-            <a:ext cx="422763" cy="6113"/>
-          </a:xfrm>
-          <a:prstGeom prst="line">
+          <a:xfrm flipH="1">
+            <a:off x="2036189" y="2284456"/>
+            <a:ext cx="1484811" cy="0"/>
+          </a:xfrm>
+          <a:prstGeom prst="straightConnector1">
             <a:avLst/>
           </a:prstGeom>
+          <a:ln>
+            <a:tailEnd type="triangle"/>
+          </a:ln>
         </p:spPr>
         <p:style>
           <a:lnRef idx="2">
@@ -4257,10 +4177,10 @@
       </p:cxnSp>
       <p:sp>
         <p:nvSpPr>
-          <p:cNvPr id="37" name="ZoneTexte 36">
-            <a:extLst>
-              <a:ext uri="{FF2B5EF4-FFF2-40B4-BE49-F238E27FC236}">
-                <a16:creationId xmlns:a16="http://schemas.microsoft.com/office/drawing/2014/main" id="{C829DA40-DCE9-4795-B93F-FCCD98C50D4F}"/>
+          <p:cNvPr id="16" name="ZoneTexte 15">
+            <a:extLst>
+              <a:ext uri="{FF2B5EF4-FFF2-40B4-BE49-F238E27FC236}">
+                <a16:creationId xmlns:a16="http://schemas.microsoft.com/office/drawing/2014/main" id="{86D7B8ED-A884-4B21-AE65-2855F14FBD5B}"/>
               </a:ext>
             </a:extLst>
           </p:cNvPr>
@@ -4269,8 +4189,8 @@
         </p:nvSpPr>
         <p:spPr>
           <a:xfrm>
-            <a:off x="3636304" y="1296857"/>
-            <a:ext cx="434734" cy="369332"/>
+            <a:off x="2493214" y="1948960"/>
+            <a:ext cx="724878" cy="369332"/>
           </a:xfrm>
           <a:prstGeom prst="rect">
             <a:avLst/>
@@ -4285,34 +4205,504 @@
           <a:p>
             <a:r>
               <a:rPr lang="fr-FR" dirty="0"/>
-              <a:t>A3</a:t>
+              <a:t>T &lt; 2s</a:t>
             </a:r>
           </a:p>
         </p:txBody>
       </p:sp>
       <p:cxnSp>
         <p:nvCxnSpPr>
-          <p:cNvPr id="3" name="Connecteur : en arc 2">
-            <a:extLst>
-              <a:ext uri="{FF2B5EF4-FFF2-40B4-BE49-F238E27FC236}">
-                <a16:creationId xmlns:a16="http://schemas.microsoft.com/office/drawing/2014/main" id="{D272BD9F-CE4B-428D-9377-2A1D854F606F}"/>
+          <p:cNvPr id="24" name="Connecteur droit avec flèche 23">
+            <a:extLst>
+              <a:ext uri="{FF2B5EF4-FFF2-40B4-BE49-F238E27FC236}">
+                <a16:creationId xmlns:a16="http://schemas.microsoft.com/office/drawing/2014/main" id="{89FE6CE7-8683-4A35-8F2C-D02B32E0EE04}"/>
               </a:ext>
             </a:extLst>
           </p:cNvPr>
           <p:cNvCxnSpPr>
             <a:cxnSpLocks/>
-            <a:stCxn id="6" idx="6"/>
-            <a:endCxn id="8" idx="0"/>
+            <a:stCxn id="8" idx="1"/>
+            <a:endCxn id="6" idx="6"/>
           </p:cNvCxnSpPr>
           <p:nvPr/>
         </p:nvCxnSpPr>
         <p:spPr>
+          <a:xfrm flipH="1" flipV="1">
+            <a:off x="4143168" y="2284456"/>
+            <a:ext cx="1535002" cy="550585"/>
+          </a:xfrm>
+          <a:prstGeom prst="straightConnector1">
+            <a:avLst/>
+          </a:prstGeom>
+          <a:ln>
+            <a:tailEnd type="triangle"/>
+          </a:ln>
+        </p:spPr>
+        <p:style>
+          <a:lnRef idx="2">
+            <a:schemeClr val="dk1"/>
+          </a:lnRef>
+          <a:fillRef idx="0">
+            <a:schemeClr val="dk1"/>
+          </a:fillRef>
+          <a:effectRef idx="1">
+            <a:schemeClr val="dk1"/>
+          </a:effectRef>
+          <a:fontRef idx="minor">
+            <a:schemeClr val="tx1"/>
+          </a:fontRef>
+        </p:style>
+      </p:cxnSp>
+      <p:sp>
+        <p:nvSpPr>
+          <p:cNvPr id="38" name="ZoneTexte 37">
+            <a:extLst>
+              <a:ext uri="{FF2B5EF4-FFF2-40B4-BE49-F238E27FC236}">
+                <a16:creationId xmlns:a16="http://schemas.microsoft.com/office/drawing/2014/main" id="{82430E43-9CBA-4B5F-ACF6-658F1CE19EAE}"/>
+              </a:ext>
+            </a:extLst>
+          </p:cNvPr>
+          <p:cNvSpPr txBox="1"/>
+          <p:nvPr/>
+        </p:nvSpPr>
+        <p:spPr>
+          <a:xfrm rot="1403471">
+            <a:off x="4610574" y="2554246"/>
+            <a:ext cx="724878" cy="369332"/>
+          </a:xfrm>
+          <a:prstGeom prst="rect">
+            <a:avLst/>
+          </a:prstGeom>
+          <a:noFill/>
+        </p:spPr>
+        <p:txBody>
+          <a:bodyPr wrap="none" rtlCol="0">
+            <a:spAutoFit/>
+          </a:bodyPr>
+          <a:lstStyle/>
+          <a:p>
+            <a:r>
+              <a:rPr lang="fr-FR" dirty="0"/>
+              <a:t>T &lt; 1s</a:t>
+            </a:r>
+          </a:p>
+        </p:txBody>
+      </p:sp>
+      <p:cxnSp>
+        <p:nvCxnSpPr>
+          <p:cNvPr id="43" name="Connecteur : en arc 42">
+            <a:extLst>
+              <a:ext uri="{FF2B5EF4-FFF2-40B4-BE49-F238E27FC236}">
+                <a16:creationId xmlns:a16="http://schemas.microsoft.com/office/drawing/2014/main" id="{5AB54E10-9C71-467A-BD42-7080E659CC97}"/>
+              </a:ext>
+            </a:extLst>
+          </p:cNvPr>
+          <p:cNvCxnSpPr>
+            <a:cxnSpLocks/>
+            <a:stCxn id="8" idx="3"/>
+            <a:endCxn id="6" idx="5"/>
+          </p:cNvCxnSpPr>
+          <p:nvPr/>
+        </p:nvCxnSpPr>
+        <p:spPr>
+          <a:xfrm rot="5400000" flipH="1">
+            <a:off x="4499831" y="2016654"/>
+            <a:ext cx="730561" cy="1626116"/>
+          </a:xfrm>
+          <a:prstGeom prst="curvedConnector3">
+            <a:avLst>
+              <a:gd name="adj1" fmla="val 8570"/>
+            </a:avLst>
+          </a:prstGeom>
+          <a:ln>
+            <a:tailEnd type="triangle"/>
+          </a:ln>
+        </p:spPr>
+        <p:style>
+          <a:lnRef idx="2">
+            <a:schemeClr val="dk1"/>
+          </a:lnRef>
+          <a:fillRef idx="0">
+            <a:schemeClr val="dk1"/>
+          </a:fillRef>
+          <a:effectRef idx="1">
+            <a:schemeClr val="dk1"/>
+          </a:effectRef>
+          <a:fontRef idx="minor">
+            <a:schemeClr val="tx1"/>
+          </a:fontRef>
+        </p:style>
+      </p:cxnSp>
+      <p:cxnSp>
+        <p:nvCxnSpPr>
+          <p:cNvPr id="41" name="Connecteur : en arc 40">
+            <a:extLst>
+              <a:ext uri="{FF2B5EF4-FFF2-40B4-BE49-F238E27FC236}">
+                <a16:creationId xmlns:a16="http://schemas.microsoft.com/office/drawing/2014/main" id="{2E1D8893-50A3-4C16-98AA-E42F4806E6B4}"/>
+              </a:ext>
+            </a:extLst>
+          </p:cNvPr>
+          <p:cNvCxnSpPr>
+            <a:cxnSpLocks/>
+            <a:stCxn id="6" idx="4"/>
+            <a:endCxn id="18" idx="7"/>
+          </p:cNvCxnSpPr>
+          <p:nvPr/>
+        </p:nvCxnSpPr>
+        <p:spPr>
+          <a:xfrm rot="5400000">
+            <a:off x="3173866" y="2910303"/>
+            <a:ext cx="1029542" cy="286894"/>
+          </a:xfrm>
+          <a:prstGeom prst="curvedConnector3">
+            <a:avLst>
+              <a:gd name="adj1" fmla="val 106608"/>
+            </a:avLst>
+          </a:prstGeom>
+          <a:ln>
+            <a:tailEnd type="triangle"/>
+          </a:ln>
+        </p:spPr>
+        <p:style>
+          <a:lnRef idx="2">
+            <a:schemeClr val="dk1"/>
+          </a:lnRef>
+          <a:fillRef idx="0">
+            <a:schemeClr val="dk1"/>
+          </a:fillRef>
+          <a:effectRef idx="1">
+            <a:schemeClr val="dk1"/>
+          </a:effectRef>
+          <a:fontRef idx="minor">
+            <a:schemeClr val="tx1"/>
+          </a:fontRef>
+        </p:style>
+      </p:cxnSp>
+      <p:cxnSp>
+        <p:nvCxnSpPr>
+          <p:cNvPr id="52" name="Connecteur : en arc 51">
+            <a:extLst>
+              <a:ext uri="{FF2B5EF4-FFF2-40B4-BE49-F238E27FC236}">
+                <a16:creationId xmlns:a16="http://schemas.microsoft.com/office/drawing/2014/main" id="{17C22186-9889-4CE2-AEBB-4562364B60A9}"/>
+              </a:ext>
+            </a:extLst>
+          </p:cNvPr>
+          <p:cNvCxnSpPr>
+            <a:cxnSpLocks/>
+            <a:stCxn id="18" idx="1"/>
+            <a:endCxn id="6" idx="3"/>
+          </p:cNvCxnSpPr>
+          <p:nvPr/>
+        </p:nvCxnSpPr>
+        <p:spPr>
+          <a:xfrm rot="5400000" flipH="1" flipV="1">
+            <a:off x="2806637" y="2763044"/>
+            <a:ext cx="1104090" cy="506864"/>
+          </a:xfrm>
+          <a:prstGeom prst="curvedConnector3">
+            <a:avLst>
+              <a:gd name="adj1" fmla="val 91865"/>
+            </a:avLst>
+          </a:prstGeom>
+          <a:ln>
+            <a:tailEnd type="triangle"/>
+          </a:ln>
+        </p:spPr>
+        <p:style>
+          <a:lnRef idx="2">
+            <a:schemeClr val="dk1"/>
+          </a:lnRef>
+          <a:fillRef idx="0">
+            <a:schemeClr val="dk1"/>
+          </a:fillRef>
+          <a:effectRef idx="1">
+            <a:schemeClr val="dk1"/>
+          </a:effectRef>
+          <a:fontRef idx="minor">
+            <a:schemeClr val="tx1"/>
+          </a:fontRef>
+        </p:style>
+      </p:cxnSp>
+      <p:cxnSp>
+        <p:nvCxnSpPr>
+          <p:cNvPr id="55" name="Connecteur droit avec flèche 54">
+            <a:extLst>
+              <a:ext uri="{FF2B5EF4-FFF2-40B4-BE49-F238E27FC236}">
+                <a16:creationId xmlns:a16="http://schemas.microsoft.com/office/drawing/2014/main" id="{C46D3FDE-BF7C-4541-8675-F2E220920870}"/>
+              </a:ext>
+            </a:extLst>
+          </p:cNvPr>
+          <p:cNvCxnSpPr>
+            <a:stCxn id="18" idx="7"/>
+            <a:endCxn id="6" idx="4"/>
+          </p:cNvCxnSpPr>
+          <p:nvPr/>
+        </p:nvCxnSpPr>
+        <p:spPr>
+          <a:xfrm flipV="1">
+            <a:off x="3545190" y="2538979"/>
+            <a:ext cx="286894" cy="1029542"/>
+          </a:xfrm>
+          <a:prstGeom prst="straightConnector1">
+            <a:avLst/>
+          </a:prstGeom>
+          <a:ln>
+            <a:tailEnd type="triangle"/>
+          </a:ln>
+        </p:spPr>
+        <p:style>
+          <a:lnRef idx="2">
+            <a:schemeClr val="dk1"/>
+          </a:lnRef>
+          <a:fillRef idx="0">
+            <a:schemeClr val="dk1"/>
+          </a:fillRef>
+          <a:effectRef idx="1">
+            <a:schemeClr val="dk1"/>
+          </a:effectRef>
+          <a:fontRef idx="minor">
+            <a:schemeClr val="tx1"/>
+          </a:fontRef>
+        </p:style>
+      </p:cxnSp>
+      <p:sp>
+        <p:nvSpPr>
+          <p:cNvPr id="58" name="ZoneTexte 57">
+            <a:extLst>
+              <a:ext uri="{FF2B5EF4-FFF2-40B4-BE49-F238E27FC236}">
+                <a16:creationId xmlns:a16="http://schemas.microsoft.com/office/drawing/2014/main" id="{DE542449-8730-46F7-83ED-60803BA87D55}"/>
+              </a:ext>
+            </a:extLst>
+          </p:cNvPr>
+          <p:cNvSpPr txBox="1"/>
+          <p:nvPr/>
+        </p:nvSpPr>
+        <p:spPr>
           <a:xfrm>
-            <a:off x="4143168" y="2284456"/>
-            <a:ext cx="1411496" cy="904170"/>
-          </a:xfrm>
-          <a:prstGeom prst="curvedConnector2">
+            <a:off x="3684853" y="3304297"/>
+            <a:ext cx="839589" cy="369332"/>
+          </a:xfrm>
+          <a:prstGeom prst="rect">
             <a:avLst/>
+          </a:prstGeom>
+          <a:noFill/>
+        </p:spPr>
+        <p:txBody>
+          <a:bodyPr wrap="none" rtlCol="0">
+            <a:spAutoFit/>
+          </a:bodyPr>
+          <a:lstStyle/>
+          <a:p>
+            <a:r>
+              <a:rPr lang="fr-FR" dirty="0"/>
+              <a:t>Palette</a:t>
+            </a:r>
+          </a:p>
+        </p:txBody>
+      </p:sp>
+      <p:sp>
+        <p:nvSpPr>
+          <p:cNvPr id="61" name="ZoneTexte 60">
+            <a:extLst>
+              <a:ext uri="{FF2B5EF4-FFF2-40B4-BE49-F238E27FC236}">
+                <a16:creationId xmlns:a16="http://schemas.microsoft.com/office/drawing/2014/main" id="{78E418F0-01A9-471B-9190-E195448238A3}"/>
+              </a:ext>
+            </a:extLst>
+          </p:cNvPr>
+          <p:cNvSpPr txBox="1"/>
+          <p:nvPr/>
+        </p:nvSpPr>
+        <p:spPr>
+          <a:xfrm rot="17229360">
+            <a:off x="3213293" y="2867627"/>
+            <a:ext cx="724878" cy="369332"/>
+          </a:xfrm>
+          <a:prstGeom prst="rect">
+            <a:avLst/>
+          </a:prstGeom>
+          <a:noFill/>
+        </p:spPr>
+        <p:txBody>
+          <a:bodyPr wrap="none" rtlCol="0">
+            <a:spAutoFit/>
+          </a:bodyPr>
+          <a:lstStyle/>
+          <a:p>
+            <a:r>
+              <a:rPr lang="fr-FR" dirty="0"/>
+              <a:t>T &lt; 1s</a:t>
+            </a:r>
+          </a:p>
+        </p:txBody>
+      </p:sp>
+      <p:sp>
+        <p:nvSpPr>
+          <p:cNvPr id="69" name="ZoneTexte 68">
+            <a:extLst>
+              <a:ext uri="{FF2B5EF4-FFF2-40B4-BE49-F238E27FC236}">
+                <a16:creationId xmlns:a16="http://schemas.microsoft.com/office/drawing/2014/main" id="{98A0110D-D148-4A40-8CC2-60A947D4E0C8}"/>
+              </a:ext>
+            </a:extLst>
+          </p:cNvPr>
+          <p:cNvSpPr txBox="1"/>
+          <p:nvPr/>
+        </p:nvSpPr>
+        <p:spPr>
+          <a:xfrm>
+            <a:off x="2000699" y="2651508"/>
+            <a:ext cx="1195905" cy="369332"/>
+          </a:xfrm>
+          <a:prstGeom prst="rect">
+            <a:avLst/>
+          </a:prstGeom>
+          <a:noFill/>
+        </p:spPr>
+        <p:txBody>
+          <a:bodyPr wrap="none" rtlCol="0">
+            <a:spAutoFit/>
+          </a:bodyPr>
+          <a:lstStyle/>
+          <a:p>
+            <a:r>
+              <a:rPr lang="fr-FR" dirty="0" err="1"/>
+              <a:t>sra</a:t>
+            </a:r>
+            <a:r>
+              <a:rPr lang="fr-FR" dirty="0"/>
+              <a:t> | </a:t>
+            </a:r>
+            <a:r>
+              <a:rPr lang="fr-FR" dirty="0" err="1"/>
+              <a:t>comp</a:t>
+            </a:r>
+            <a:endParaRPr lang="fr-FR" dirty="0"/>
+          </a:p>
+        </p:txBody>
+      </p:sp>
+      <p:grpSp>
+        <p:nvGrpSpPr>
+          <p:cNvPr id="75" name="Groupe 74">
+            <a:extLst>
+              <a:ext uri="{FF2B5EF4-FFF2-40B4-BE49-F238E27FC236}">
+                <a16:creationId xmlns:a16="http://schemas.microsoft.com/office/drawing/2014/main" id="{40CC39C8-75EF-43F3-BA45-580D6B30BA2E}"/>
+              </a:ext>
+            </a:extLst>
+          </p:cNvPr>
+          <p:cNvGrpSpPr/>
+          <p:nvPr/>
+        </p:nvGrpSpPr>
+        <p:grpSpPr>
+          <a:xfrm>
+            <a:off x="4376591" y="3205837"/>
+            <a:ext cx="1575047" cy="369332"/>
+            <a:chOff x="4502233" y="3566516"/>
+            <a:chExt cx="1575047" cy="369332"/>
+          </a:xfrm>
+        </p:grpSpPr>
+        <p:sp>
+          <p:nvSpPr>
+            <p:cNvPr id="47" name="ZoneTexte 46">
+              <a:extLst>
+                <a:ext uri="{FF2B5EF4-FFF2-40B4-BE49-F238E27FC236}">
+                  <a16:creationId xmlns:a16="http://schemas.microsoft.com/office/drawing/2014/main" id="{7AE0D6AF-EA40-4E70-A50D-3B227C066B2E}"/>
+                </a:ext>
+              </a:extLst>
+            </p:cNvPr>
+            <p:cNvSpPr txBox="1"/>
+            <p:nvPr/>
+          </p:nvSpPr>
+          <p:spPr>
+            <a:xfrm>
+              <a:off x="4502233" y="3566516"/>
+              <a:ext cx="1575047" cy="369332"/>
+            </a:xfrm>
+            <a:prstGeom prst="rect">
+              <a:avLst/>
+            </a:prstGeom>
+            <a:noFill/>
+          </p:spPr>
+          <p:txBody>
+            <a:bodyPr wrap="none" rtlCol="0">
+              <a:spAutoFit/>
+            </a:bodyPr>
+            <a:lstStyle/>
+            <a:p>
+              <a:r>
+                <a:rPr lang="fr-FR" dirty="0"/>
+                <a:t>Palette | </a:t>
+              </a:r>
+              <a:r>
+                <a:rPr lang="fr-FR" dirty="0" err="1"/>
+                <a:t>comp</a:t>
+              </a:r>
+              <a:endParaRPr lang="fr-FR" dirty="0"/>
+            </a:p>
+          </p:txBody>
+        </p:sp>
+        <p:cxnSp>
+          <p:nvCxnSpPr>
+            <p:cNvPr id="73" name="Connecteur droit 72">
+              <a:extLst>
+                <a:ext uri="{FF2B5EF4-FFF2-40B4-BE49-F238E27FC236}">
+                  <a16:creationId xmlns:a16="http://schemas.microsoft.com/office/drawing/2014/main" id="{F590C5FC-AAA0-4ED9-B670-3161A7AF4E7E}"/>
+                </a:ext>
+              </a:extLst>
+            </p:cNvPr>
+            <p:cNvCxnSpPr>
+              <a:cxnSpLocks/>
+            </p:cNvCxnSpPr>
+            <p:nvPr/>
+          </p:nvCxnSpPr>
+          <p:spPr>
+            <a:xfrm>
+              <a:off x="5399934" y="3647138"/>
+              <a:ext cx="475825" cy="0"/>
+            </a:xfrm>
+            <a:prstGeom prst="line">
+              <a:avLst/>
+            </a:prstGeom>
+          </p:spPr>
+          <p:style>
+            <a:lnRef idx="1">
+              <a:schemeClr val="dk1"/>
+            </a:lnRef>
+            <a:fillRef idx="0">
+              <a:schemeClr val="dk1"/>
+            </a:fillRef>
+            <a:effectRef idx="0">
+              <a:schemeClr val="dk1"/>
+            </a:effectRef>
+            <a:fontRef idx="minor">
+              <a:schemeClr val="tx1"/>
+            </a:fontRef>
+          </p:style>
+        </p:cxnSp>
+      </p:grpSp>
+      <p:cxnSp>
+        <p:nvCxnSpPr>
+          <p:cNvPr id="77" name="Connecteur : en arc 76">
+            <a:extLst>
+              <a:ext uri="{FF2B5EF4-FFF2-40B4-BE49-F238E27FC236}">
+                <a16:creationId xmlns:a16="http://schemas.microsoft.com/office/drawing/2014/main" id="{D801F456-6A4B-494C-921B-A51645AD3693}"/>
+              </a:ext>
+            </a:extLst>
+          </p:cNvPr>
+          <p:cNvCxnSpPr>
+            <a:cxnSpLocks/>
+            <a:stCxn id="8" idx="5"/>
+            <a:endCxn id="5" idx="3"/>
+          </p:cNvCxnSpPr>
+          <p:nvPr/>
+        </p:nvCxnSpPr>
+        <p:spPr>
+          <a:xfrm rot="5400000" flipH="1">
+            <a:off x="3446342" y="523225"/>
+            <a:ext cx="730561" cy="4612975"/>
+          </a:xfrm>
+          <a:prstGeom prst="curvedConnector3">
+            <a:avLst>
+              <a:gd name="adj1" fmla="val -277916"/>
+            </a:avLst>
           </a:prstGeom>
           <a:ln>
             <a:tailEnd type="triangle"/>
@@ -4335,10 +4725,10 @@
       </p:cxnSp>
       <p:grpSp>
         <p:nvGrpSpPr>
-          <p:cNvPr id="20" name="Groupe 19">
-            <a:extLst>
-              <a:ext uri="{FF2B5EF4-FFF2-40B4-BE49-F238E27FC236}">
-                <a16:creationId xmlns:a16="http://schemas.microsoft.com/office/drawing/2014/main" id="{5006EBEB-BD13-49C8-9107-6A0AE90A9C72}"/>
+          <p:cNvPr id="81" name="Groupe 80">
+            <a:extLst>
+              <a:ext uri="{FF2B5EF4-FFF2-40B4-BE49-F238E27FC236}">
+                <a16:creationId xmlns:a16="http://schemas.microsoft.com/office/drawing/2014/main" id="{F0765BBC-2003-4522-A046-4AFE50A989CE}"/>
               </a:ext>
             </a:extLst>
           </p:cNvPr>
@@ -4347,18 +4737,18 @@
         </p:nvGrpSpPr>
         <p:grpSpPr>
           <a:xfrm>
-            <a:off x="4961682" y="1764194"/>
-            <a:ext cx="744435" cy="738863"/>
-            <a:chOff x="5093827" y="2075610"/>
-            <a:chExt cx="744435" cy="738863"/>
+            <a:off x="4695062" y="4938712"/>
+            <a:ext cx="1575047" cy="710089"/>
+            <a:chOff x="5017673" y="2075610"/>
+            <a:chExt cx="1575047" cy="710089"/>
           </a:xfrm>
         </p:grpSpPr>
         <p:sp>
           <p:nvSpPr>
-            <p:cNvPr id="25" name="ZoneTexte 24">
+            <p:cNvPr id="83" name="ZoneTexte 82">
               <a:extLst>
                 <a:ext uri="{FF2B5EF4-FFF2-40B4-BE49-F238E27FC236}">
-                  <a16:creationId xmlns:a16="http://schemas.microsoft.com/office/drawing/2014/main" id="{A65E9E9D-61B5-4ADC-B84A-DAE70F5F0248}"/>
+                  <a16:creationId xmlns:a16="http://schemas.microsoft.com/office/drawing/2014/main" id="{31066EFB-2B04-46CD-A81E-9DF609F87BC9}"/>
                 </a:ext>
               </a:extLst>
             </p:cNvPr>
@@ -4367,8 +4757,8 @@
           </p:nvSpPr>
           <p:spPr>
             <a:xfrm>
-              <a:off x="5206497" y="2075610"/>
-              <a:ext cx="512704" cy="369332"/>
+              <a:off x="5017673" y="2075610"/>
+              <a:ext cx="1575047" cy="369332"/>
             </a:xfrm>
             <a:prstGeom prst="rect">
               <a:avLst/>
@@ -4383,17 +4773,22 @@
             <a:p>
               <a:r>
                 <a:rPr lang="fr-FR" dirty="0"/>
-                <a:t>Ev2</a:t>
+                <a:t>Palette | </a:t>
               </a:r>
+              <a:r>
+                <a:rPr lang="fr-FR" dirty="0" err="1"/>
+                <a:t>comp</a:t>
+              </a:r>
+              <a:endParaRPr lang="fr-FR" dirty="0"/>
             </a:p>
           </p:txBody>
         </p:sp>
         <p:cxnSp>
           <p:nvCxnSpPr>
-            <p:cNvPr id="26" name="Connecteur droit 25">
+            <p:cNvPr id="84" name="Connecteur droit 83">
               <a:extLst>
                 <a:ext uri="{FF2B5EF4-FFF2-40B4-BE49-F238E27FC236}">
-                  <a16:creationId xmlns:a16="http://schemas.microsoft.com/office/drawing/2014/main" id="{8469AB5A-C4E1-48BD-A651-A5D8711839B8}"/>
+                  <a16:creationId xmlns:a16="http://schemas.microsoft.com/office/drawing/2014/main" id="{478C3789-B4D7-4B01-AB48-5F1C018CD00F}"/>
                 </a:ext>
               </a:extLst>
             </p:cNvPr>
@@ -4404,8 +4799,8 @@
           </p:nvCxnSpPr>
           <p:spPr>
             <a:xfrm flipV="1">
-              <a:off x="5234664" y="2429171"/>
-              <a:ext cx="422763" cy="6113"/>
+              <a:off x="5234664" y="2435284"/>
+              <a:ext cx="1115075" cy="1"/>
             </a:xfrm>
             <a:prstGeom prst="line">
               <a:avLst/>
@@ -4428,10 +4823,10 @@
         </p:cxnSp>
         <p:sp>
           <p:nvSpPr>
-            <p:cNvPr id="30" name="ZoneTexte 29">
+            <p:cNvPr id="85" name="ZoneTexte 84">
               <a:extLst>
                 <a:ext uri="{FF2B5EF4-FFF2-40B4-BE49-F238E27FC236}">
-                  <a16:creationId xmlns:a16="http://schemas.microsoft.com/office/drawing/2014/main" id="{01779251-F854-4C37-9A17-11CC0F53592C}"/>
+                  <a16:creationId xmlns:a16="http://schemas.microsoft.com/office/drawing/2014/main" id="{99CF3C30-3693-4E1F-9A5B-41564D9F6A8F}"/>
                 </a:ext>
               </a:extLst>
             </p:cNvPr>
@@ -4440,8 +4835,8 @@
           </p:nvSpPr>
           <p:spPr>
             <a:xfrm>
-              <a:off x="5093827" y="2445141"/>
-              <a:ext cx="744435" cy="369332"/>
+              <a:off x="5589227" y="2416367"/>
+              <a:ext cx="434734" cy="369332"/>
             </a:xfrm>
             <a:prstGeom prst="rect">
               <a:avLst/>
@@ -4456,7 +4851,7 @@
             <a:p>
               <a:r>
                 <a:rPr lang="fr-FR" dirty="0"/>
-                <a:t>A3,A4</a:t>
+                <a:t>A5</a:t>
               </a:r>
             </a:p>
           </p:txBody>
@@ -4464,180 +4859,29 @@
       </p:grpSp>
       <p:cxnSp>
         <p:nvCxnSpPr>
-          <p:cNvPr id="15" name="Connecteur droit avec flèche 14">
-            <a:extLst>
-              <a:ext uri="{FF2B5EF4-FFF2-40B4-BE49-F238E27FC236}">
-                <a16:creationId xmlns:a16="http://schemas.microsoft.com/office/drawing/2014/main" id="{822D558C-45B1-4DDA-920B-F79C97F5B3CC}"/>
+          <p:cNvPr id="91" name="Connecteur : en arc 90">
+            <a:extLst>
+              <a:ext uri="{FF2B5EF4-FFF2-40B4-BE49-F238E27FC236}">
+                <a16:creationId xmlns:a16="http://schemas.microsoft.com/office/drawing/2014/main" id="{A703D583-A92B-4181-A63C-3676F80A132C}"/>
               </a:ext>
             </a:extLst>
           </p:cNvPr>
           <p:cNvCxnSpPr>
-            <a:stCxn id="6" idx="2"/>
-            <a:endCxn id="5" idx="6"/>
+            <a:cxnSpLocks/>
+            <a:stCxn id="18" idx="4"/>
+            <a:endCxn id="5" idx="4"/>
           </p:cNvCxnSpPr>
           <p:nvPr/>
         </p:nvCxnSpPr>
         <p:spPr>
-          <a:xfrm flipH="1">
-            <a:off x="2036189" y="2284456"/>
-            <a:ext cx="1484811" cy="0"/>
-          </a:xfrm>
-          <a:prstGeom prst="straightConnector1">
-            <a:avLst/>
-          </a:prstGeom>
-          <a:ln>
-            <a:tailEnd type="triangle"/>
-          </a:ln>
-        </p:spPr>
-        <p:style>
-          <a:lnRef idx="2">
-            <a:schemeClr val="dk1"/>
-          </a:lnRef>
-          <a:fillRef idx="0">
-            <a:schemeClr val="dk1"/>
-          </a:fillRef>
-          <a:effectRef idx="1">
-            <a:schemeClr val="dk1"/>
-          </a:effectRef>
-          <a:fontRef idx="minor">
-            <a:schemeClr val="tx1"/>
-          </a:fontRef>
-        </p:style>
-      </p:cxnSp>
-      <p:sp>
-        <p:nvSpPr>
-          <p:cNvPr id="16" name="ZoneTexte 15">
-            <a:extLst>
-              <a:ext uri="{FF2B5EF4-FFF2-40B4-BE49-F238E27FC236}">
-                <a16:creationId xmlns:a16="http://schemas.microsoft.com/office/drawing/2014/main" id="{86D7B8ED-A884-4B21-AE65-2855F14FBD5B}"/>
-              </a:ext>
-            </a:extLst>
-          </p:cNvPr>
-          <p:cNvSpPr txBox="1"/>
-          <p:nvPr/>
-        </p:nvSpPr>
-        <p:spPr>
-          <a:xfrm>
-            <a:off x="2493214" y="1948960"/>
-            <a:ext cx="724878" cy="369332"/>
-          </a:xfrm>
-          <a:prstGeom prst="rect">
-            <a:avLst/>
-          </a:prstGeom>
-          <a:noFill/>
-        </p:spPr>
-        <p:txBody>
-          <a:bodyPr wrap="none" rtlCol="0">
-            <a:spAutoFit/>
-          </a:bodyPr>
-          <a:lstStyle/>
-          <a:p>
-            <a:r>
-              <a:rPr lang="fr-FR" dirty="0"/>
-              <a:t>T &lt; 2s</a:t>
-            </a:r>
-          </a:p>
-        </p:txBody>
-      </p:sp>
-      <p:cxnSp>
-        <p:nvCxnSpPr>
-          <p:cNvPr id="24" name="Connecteur droit avec flèche 23">
-            <a:extLst>
-              <a:ext uri="{FF2B5EF4-FFF2-40B4-BE49-F238E27FC236}">
-                <a16:creationId xmlns:a16="http://schemas.microsoft.com/office/drawing/2014/main" id="{89FE6CE7-8683-4A35-8F2C-D02B32E0EE04}"/>
-              </a:ext>
-            </a:extLst>
-          </p:cNvPr>
-          <p:cNvCxnSpPr>
-            <a:stCxn id="8" idx="1"/>
-            <a:endCxn id="6" idx="5"/>
-          </p:cNvCxnSpPr>
-          <p:nvPr/>
-        </p:nvCxnSpPr>
-        <p:spPr>
-          <a:xfrm flipH="1" flipV="1">
-            <a:off x="4052054" y="2464431"/>
-            <a:ext cx="1282640" cy="798743"/>
-          </a:xfrm>
-          <a:prstGeom prst="straightConnector1">
-            <a:avLst/>
-          </a:prstGeom>
-          <a:ln>
-            <a:tailEnd type="triangle"/>
-          </a:ln>
-        </p:spPr>
-        <p:style>
-          <a:lnRef idx="2">
-            <a:schemeClr val="dk1"/>
-          </a:lnRef>
-          <a:fillRef idx="0">
-            <a:schemeClr val="dk1"/>
-          </a:fillRef>
-          <a:effectRef idx="1">
-            <a:schemeClr val="dk1"/>
-          </a:effectRef>
-          <a:fontRef idx="minor">
-            <a:schemeClr val="tx1"/>
-          </a:fontRef>
-        </p:style>
-      </p:cxnSp>
-      <p:sp>
-        <p:nvSpPr>
-          <p:cNvPr id="38" name="ZoneTexte 37">
-            <a:extLst>
-              <a:ext uri="{FF2B5EF4-FFF2-40B4-BE49-F238E27FC236}">
-                <a16:creationId xmlns:a16="http://schemas.microsoft.com/office/drawing/2014/main" id="{82430E43-9CBA-4B5F-ACF6-658F1CE19EAE}"/>
-              </a:ext>
-            </a:extLst>
-          </p:cNvPr>
-          <p:cNvSpPr txBox="1"/>
-          <p:nvPr/>
-        </p:nvSpPr>
-        <p:spPr>
-          <a:xfrm rot="1930817">
-            <a:off x="4462301" y="2597105"/>
-            <a:ext cx="724878" cy="369332"/>
-          </a:xfrm>
-          <a:prstGeom prst="rect">
-            <a:avLst/>
-          </a:prstGeom>
-          <a:noFill/>
-        </p:spPr>
-        <p:txBody>
-          <a:bodyPr wrap="none" rtlCol="0">
-            <a:spAutoFit/>
-          </a:bodyPr>
-          <a:lstStyle/>
-          <a:p>
-            <a:r>
-              <a:rPr lang="fr-FR" dirty="0"/>
-              <a:t>T &lt; 1s</a:t>
-            </a:r>
-          </a:p>
-        </p:txBody>
-      </p:sp>
-      <p:cxnSp>
-        <p:nvCxnSpPr>
-          <p:cNvPr id="43" name="Connecteur : en arc 42">
-            <a:extLst>
-              <a:ext uri="{FF2B5EF4-FFF2-40B4-BE49-F238E27FC236}">
-                <a16:creationId xmlns:a16="http://schemas.microsoft.com/office/drawing/2014/main" id="{5AB54E10-9C71-467A-BD42-7080E659CC97}"/>
-              </a:ext>
-            </a:extLst>
-          </p:cNvPr>
-          <p:cNvCxnSpPr>
-            <a:cxnSpLocks/>
-            <a:endCxn id="6" idx="4"/>
-          </p:cNvCxnSpPr>
-          <p:nvPr/>
-        </p:nvCxnSpPr>
-        <p:spPr>
-          <a:xfrm rot="10800000">
-            <a:off x="3832085" y="2538980"/>
-            <a:ext cx="1397769" cy="952073"/>
-          </a:xfrm>
-          <a:prstGeom prst="curvedConnector2">
-            <a:avLst/>
+          <a:xfrm rot="5400000" flipH="1">
+            <a:off x="1793142" y="2470943"/>
+            <a:ext cx="1464041" cy="1600115"/>
+          </a:xfrm>
+          <a:prstGeom prst="curvedConnector3">
+            <a:avLst>
+              <a:gd name="adj1" fmla="val 3123"/>
+            </a:avLst>
           </a:prstGeom>
           <a:ln>
             <a:tailEnd type="triangle"/>
@@ -4660,10 +4904,10 @@
       </p:cxnSp>
       <p:grpSp>
         <p:nvGrpSpPr>
-          <p:cNvPr id="46" name="Groupe 45">
-            <a:extLst>
-              <a:ext uri="{FF2B5EF4-FFF2-40B4-BE49-F238E27FC236}">
-                <a16:creationId xmlns:a16="http://schemas.microsoft.com/office/drawing/2014/main" id="{E40AEE8A-B075-4213-BC26-B44CAC07D28C}"/>
+          <p:cNvPr id="93" name="Groupe 92">
+            <a:extLst>
+              <a:ext uri="{FF2B5EF4-FFF2-40B4-BE49-F238E27FC236}">
+                <a16:creationId xmlns:a16="http://schemas.microsoft.com/office/drawing/2014/main" id="{12E6EA0B-6042-40BC-848C-BAEA1004646B}"/>
               </a:ext>
             </a:extLst>
           </p:cNvPr>
@@ -4672,18 +4916,18 @@
         </p:nvGrpSpPr>
         <p:grpSpPr>
           <a:xfrm>
-            <a:off x="3929538" y="3179145"/>
-            <a:ext cx="512704" cy="738664"/>
+            <a:off x="2538064" y="4043915"/>
+            <a:ext cx="1195905" cy="710089"/>
             <a:chOff x="5206497" y="2075610"/>
-            <a:chExt cx="512704" cy="738664"/>
+            <a:chExt cx="1195905" cy="710089"/>
           </a:xfrm>
         </p:grpSpPr>
         <p:sp>
           <p:nvSpPr>
-            <p:cNvPr id="47" name="ZoneTexte 46">
+            <p:cNvPr id="94" name="ZoneTexte 93">
               <a:extLst>
                 <a:ext uri="{FF2B5EF4-FFF2-40B4-BE49-F238E27FC236}">
-                  <a16:creationId xmlns:a16="http://schemas.microsoft.com/office/drawing/2014/main" id="{7AE0D6AF-EA40-4E70-A50D-3B227C066B2E}"/>
+                  <a16:creationId xmlns:a16="http://schemas.microsoft.com/office/drawing/2014/main" id="{C91F7B7E-218B-4FEA-AEAD-DF74F081FF95}"/>
                 </a:ext>
               </a:extLst>
             </p:cNvPr>
@@ -4693,7 +4937,7 @@
           <p:spPr>
             <a:xfrm>
               <a:off x="5206497" y="2075610"/>
-              <a:ext cx="512704" cy="369332"/>
+              <a:ext cx="1195905" cy="369332"/>
             </a:xfrm>
             <a:prstGeom prst="rect">
               <a:avLst/>
@@ -4707,18 +4951,27 @@
             <a:lstStyle/>
             <a:p>
               <a:r>
+                <a:rPr lang="fr-FR" dirty="0" err="1"/>
+                <a:t>sra</a:t>
+              </a:r>
+              <a:r>
                 <a:rPr lang="fr-FR" dirty="0"/>
-                <a:t>Ev3</a:t>
+                <a:t> | </a:t>
               </a:r>
+              <a:r>
+                <a:rPr lang="fr-FR" dirty="0" err="1"/>
+                <a:t>comp</a:t>
+              </a:r>
+              <a:endParaRPr lang="fr-FR" dirty="0"/>
             </a:p>
           </p:txBody>
         </p:sp>
         <p:cxnSp>
           <p:nvCxnSpPr>
-            <p:cNvPr id="48" name="Connecteur droit 47">
+            <p:cNvPr id="95" name="Connecteur droit 94">
               <a:extLst>
                 <a:ext uri="{FF2B5EF4-FFF2-40B4-BE49-F238E27FC236}">
-                  <a16:creationId xmlns:a16="http://schemas.microsoft.com/office/drawing/2014/main" id="{F81362E9-970F-46FA-A4D0-D464D30A0E21}"/>
+                  <a16:creationId xmlns:a16="http://schemas.microsoft.com/office/drawing/2014/main" id="{9FA5D36E-D353-4EFB-AFB0-3D7103B47E8A}"/>
                 </a:ext>
               </a:extLst>
             </p:cNvPr>
@@ -4729,8 +4982,8 @@
           </p:nvCxnSpPr>
           <p:spPr>
             <a:xfrm flipV="1">
-              <a:off x="5234664" y="2429171"/>
-              <a:ext cx="422763" cy="6113"/>
+              <a:off x="5234664" y="2435284"/>
+              <a:ext cx="1115075" cy="1"/>
             </a:xfrm>
             <a:prstGeom prst="line">
               <a:avLst/>
@@ -4753,10 +5006,10 @@
         </p:cxnSp>
         <p:sp>
           <p:nvSpPr>
-            <p:cNvPr id="49" name="ZoneTexte 48">
+            <p:cNvPr id="96" name="ZoneTexte 95">
               <a:extLst>
                 <a:ext uri="{FF2B5EF4-FFF2-40B4-BE49-F238E27FC236}">
-                  <a16:creationId xmlns:a16="http://schemas.microsoft.com/office/drawing/2014/main" id="{51435C5C-AD65-4447-9294-A4DF9BC1B0C3}"/>
+                  <a16:creationId xmlns:a16="http://schemas.microsoft.com/office/drawing/2014/main" id="{D16CB64B-77F8-4F04-A2FF-FA6063E4A1EC}"/>
                 </a:ext>
               </a:extLst>
             </p:cNvPr>
@@ -4765,7 +5018,7 @@
           </p:nvSpPr>
           <p:spPr>
             <a:xfrm>
-              <a:off x="5237236" y="2444942"/>
+              <a:off x="5589227" y="2416367"/>
               <a:ext cx="434734" cy="369332"/>
             </a:xfrm>
             <a:prstGeom prst="rect">
@@ -4787,6 +5040,44 @@
           </p:txBody>
         </p:sp>
       </p:grpSp>
+      <p:cxnSp>
+        <p:nvCxnSpPr>
+          <p:cNvPr id="98" name="Connecteur droit 97">
+            <a:extLst>
+              <a:ext uri="{FF2B5EF4-FFF2-40B4-BE49-F238E27FC236}">
+                <a16:creationId xmlns:a16="http://schemas.microsoft.com/office/drawing/2014/main" id="{F6E1EE49-CD09-4880-B39F-BF735A0034AA}"/>
+              </a:ext>
+            </a:extLst>
+          </p:cNvPr>
+          <p:cNvCxnSpPr>
+            <a:cxnSpLocks/>
+          </p:cNvCxnSpPr>
+          <p:nvPr/>
+        </p:nvCxnSpPr>
+        <p:spPr>
+          <a:xfrm>
+            <a:off x="2598651" y="2738912"/>
+            <a:ext cx="475825" cy="0"/>
+          </a:xfrm>
+          <a:prstGeom prst="line">
+            <a:avLst/>
+          </a:prstGeom>
+        </p:spPr>
+        <p:style>
+          <a:lnRef idx="1">
+            <a:schemeClr val="dk1"/>
+          </a:lnRef>
+          <a:fillRef idx="0">
+            <a:schemeClr val="dk1"/>
+          </a:fillRef>
+          <a:effectRef idx="0">
+            <a:schemeClr val="dk1"/>
+          </a:effectRef>
+          <a:fontRef idx="minor">
+            <a:schemeClr val="tx1"/>
+          </a:fontRef>
+        </p:style>
+      </p:cxnSp>
     </p:spTree>
     <p:extLst>
       <p:ext uri="{BB962C8B-B14F-4D97-AF65-F5344CB8AC3E}">
@@ -6107,7 +6398,7 @@
                       <a:pPr algn="ctr"/>
                       <a:r>
                         <a:rPr lang="fr-FR" dirty="0"/>
-                        <a:t>Ev1</a:t>
+                        <a:t>1$</a:t>
                       </a:r>
                     </a:p>
                   </a:txBody>
@@ -6120,22 +6411,8 @@
                     <a:p>
                       <a:pPr algn="ctr"/>
                       <a:r>
-                        <a:rPr lang="fr-FR" dirty="0"/>
-                        <a:t>Ev2</a:t>
-                      </a:r>
-                    </a:p>
-                  </a:txBody>
-                  <a:tcPr/>
-                </a:tc>
-                <a:tc>
-                  <a:txBody>
-                    <a:bodyPr/>
-                    <a:lstStyle/>
-                    <a:p>
-                      <a:pPr algn="ctr"/>
-                      <a:r>
-                        <a:rPr lang="fr-FR"/>
-                        <a:t>Ev3</a:t>
+                        <a:rPr lang="fr-FR" dirty="0" err="1"/>
+                        <a:t>sra</a:t>
                       </a:r>
                       <a:endParaRPr lang="fr-FR" dirty="0"/>
                     </a:p>
@@ -6150,8 +6427,23 @@
                       <a:pPr algn="ctr"/>
                       <a:r>
                         <a:rPr lang="fr-FR" dirty="0"/>
+                        <a:t>Palette</a:t>
+                      </a:r>
+                    </a:p>
+                  </a:txBody>
+                  <a:tcPr/>
+                </a:tc>
+                <a:tc>
+                  <a:txBody>
+                    <a:bodyPr/>
+                    <a:lstStyle/>
+                    <a:p>
+                      <a:pPr algn="ctr"/>
+                      <a:r>
+                        <a:rPr lang="fr-FR"/>
                         <a:t>Ev4</a:t>
                       </a:r>
+                      <a:endParaRPr lang="fr-FR" dirty="0"/>
                     </a:p>
                   </a:txBody>
                   <a:tcPr/>

</xml_diff>

<commit_message>
Avancée code, E0,E1, bonne partie E2
</commit_message>
<xml_diff>
--- a/Concep/MachineEtat.pptx
+++ b/Concep/MachineEtat.pptx
@@ -260,7 +260,7 @@
           <a:p>
             <a:fld id="{F4A82166-679B-4DCA-B2EB-D3A018EE558C}" type="datetimeFigureOut">
               <a:rPr lang="fr-FR" smtClean="0"/>
-              <a:t>28/11/2019</a:t>
+              <a:t>31/12/2019</a:t>
             </a:fld>
             <a:endParaRPr lang="fr-FR"/>
           </a:p>
@@ -458,7 +458,7 @@
           <a:p>
             <a:fld id="{F4A82166-679B-4DCA-B2EB-D3A018EE558C}" type="datetimeFigureOut">
               <a:rPr lang="fr-FR" smtClean="0"/>
-              <a:t>28/11/2019</a:t>
+              <a:t>31/12/2019</a:t>
             </a:fld>
             <a:endParaRPr lang="fr-FR"/>
           </a:p>
@@ -666,7 +666,7 @@
           <a:p>
             <a:fld id="{F4A82166-679B-4DCA-B2EB-D3A018EE558C}" type="datetimeFigureOut">
               <a:rPr lang="fr-FR" smtClean="0"/>
-              <a:t>28/11/2019</a:t>
+              <a:t>31/12/2019</a:t>
             </a:fld>
             <a:endParaRPr lang="fr-FR"/>
           </a:p>
@@ -864,7 +864,7 @@
           <a:p>
             <a:fld id="{F4A82166-679B-4DCA-B2EB-D3A018EE558C}" type="datetimeFigureOut">
               <a:rPr lang="fr-FR" smtClean="0"/>
-              <a:t>28/11/2019</a:t>
+              <a:t>31/12/2019</a:t>
             </a:fld>
             <a:endParaRPr lang="fr-FR"/>
           </a:p>
@@ -1139,7 +1139,7 @@
           <a:p>
             <a:fld id="{F4A82166-679B-4DCA-B2EB-D3A018EE558C}" type="datetimeFigureOut">
               <a:rPr lang="fr-FR" smtClean="0"/>
-              <a:t>28/11/2019</a:t>
+              <a:t>31/12/2019</a:t>
             </a:fld>
             <a:endParaRPr lang="fr-FR"/>
           </a:p>
@@ -1404,7 +1404,7 @@
           <a:p>
             <a:fld id="{F4A82166-679B-4DCA-B2EB-D3A018EE558C}" type="datetimeFigureOut">
               <a:rPr lang="fr-FR" smtClean="0"/>
-              <a:t>28/11/2019</a:t>
+              <a:t>31/12/2019</a:t>
             </a:fld>
             <a:endParaRPr lang="fr-FR"/>
           </a:p>
@@ -1816,7 +1816,7 @@
           <a:p>
             <a:fld id="{F4A82166-679B-4DCA-B2EB-D3A018EE558C}" type="datetimeFigureOut">
               <a:rPr lang="fr-FR" smtClean="0"/>
-              <a:t>28/11/2019</a:t>
+              <a:t>31/12/2019</a:t>
             </a:fld>
             <a:endParaRPr lang="fr-FR"/>
           </a:p>
@@ -1957,7 +1957,7 @@
           <a:p>
             <a:fld id="{F4A82166-679B-4DCA-B2EB-D3A018EE558C}" type="datetimeFigureOut">
               <a:rPr lang="fr-FR" smtClean="0"/>
-              <a:t>28/11/2019</a:t>
+              <a:t>31/12/2019</a:t>
             </a:fld>
             <a:endParaRPr lang="fr-FR"/>
           </a:p>
@@ -2070,7 +2070,7 @@
           <a:p>
             <a:fld id="{F4A82166-679B-4DCA-B2EB-D3A018EE558C}" type="datetimeFigureOut">
               <a:rPr lang="fr-FR" smtClean="0"/>
-              <a:t>28/11/2019</a:t>
+              <a:t>31/12/2019</a:t>
             </a:fld>
             <a:endParaRPr lang="fr-FR"/>
           </a:p>
@@ -2381,7 +2381,7 @@
           <a:p>
             <a:fld id="{F4A82166-679B-4DCA-B2EB-D3A018EE558C}" type="datetimeFigureOut">
               <a:rPr lang="fr-FR" smtClean="0"/>
-              <a:t>28/11/2019</a:t>
+              <a:t>31/12/2019</a:t>
             </a:fld>
             <a:endParaRPr lang="fr-FR"/>
           </a:p>
@@ -2669,7 +2669,7 @@
           <a:p>
             <a:fld id="{F4A82166-679B-4DCA-B2EB-D3A018EE558C}" type="datetimeFigureOut">
               <a:rPr lang="fr-FR" smtClean="0"/>
-              <a:t>28/11/2019</a:t>
+              <a:t>31/12/2019</a:t>
             </a:fld>
             <a:endParaRPr lang="fr-FR"/>
           </a:p>
@@ -2910,7 +2910,7 @@
           <a:p>
             <a:fld id="{F4A82166-679B-4DCA-B2EB-D3A018EE558C}" type="datetimeFigureOut">
               <a:rPr lang="fr-FR" smtClean="0"/>
-              <a:t>28/11/2019</a:t>
+              <a:t>31/12/2019</a:t>
             </a:fld>
             <a:endParaRPr lang="fr-FR"/>
           </a:p>
@@ -3665,12 +3665,8 @@
           </a:p>
           <a:p>
             <a:r>
-              <a:rPr lang="fr-FR" dirty="0" err="1"/>
-              <a:t>comm</a:t>
-            </a:r>
-            <a:r>
               <a:rPr lang="fr-FR" dirty="0"/>
-              <a:t> : Commande</a:t>
+              <a:t>command : Commande</a:t>
             </a:r>
           </a:p>
           <a:p>
@@ -4973,7 +4969,7 @@
           <p:nvPr>
             <p:extLst>
               <p:ext uri="{D42A27DB-BD31-4B8C-83A1-F6EECF244321}">
-                <p14:modId xmlns:p14="http://schemas.microsoft.com/office/powerpoint/2010/main" val="2611831121"/>
+                <p14:modId xmlns:p14="http://schemas.microsoft.com/office/powerpoint/2010/main" val="2546217471"/>
               </p:ext>
             </p:extLst>
           </p:nvPr>
@@ -5262,13 +5258,8 @@
                       <a:pPr algn="l"/>
                       <a:r>
                         <a:rPr lang="fr-FR" dirty="0"/>
-                        <a:t>Remplir </a:t>
+                        <a:t>Remplir command</a:t>
                       </a:r>
-                      <a:r>
-                        <a:rPr lang="fr-FR" dirty="0" err="1"/>
-                        <a:t>comm</a:t>
-                      </a:r>
-                      <a:endParaRPr lang="fr-FR" dirty="0"/>
                     </a:p>
                     <a:p>
                       <a:pPr algn="l"/>
@@ -5314,13 +5305,8 @@
                       <a:pPr algn="l"/>
                       <a:r>
                         <a:rPr lang="fr-FR" dirty="0"/>
-                        <a:t>Remplir </a:t>
+                        <a:t>Remplir command</a:t>
                       </a:r>
-                      <a:r>
-                        <a:rPr lang="fr-FR" dirty="0" err="1"/>
-                        <a:t>comm</a:t>
-                      </a:r>
-                      <a:endParaRPr lang="fr-FR" dirty="0"/>
                     </a:p>
                     <a:p>
                       <a:pPr algn="l"/>
@@ -5417,12 +5403,8 @@
                     <a:p>
                       <a:pPr algn="l"/>
                       <a:r>
-                        <a:rPr lang="fr-FR" dirty="0"/>
-                        <a:t>Remplir </a:t>
-                      </a:r>
-                      <a:r>
-                        <a:rPr lang="fr-FR" dirty="0" err="1"/>
-                        <a:t>comm</a:t>
+                        <a:rPr lang="fr-FR"/>
+                        <a:t>Remplir command</a:t>
                       </a:r>
                       <a:endParaRPr lang="fr-FR" dirty="0"/>
                     </a:p>
@@ -5543,25 +5525,15 @@
                       </a:r>
                       <a:r>
                         <a:rPr lang="fr-FR" dirty="0"/>
-                        <a:t> = position | couleur </a:t>
+                        <a:t> = position | couleur objet existant</a:t>
                       </a:r>
-                      <a:r>
-                        <a:rPr lang="fr-FR" dirty="0" err="1"/>
-                        <a:t>objetexistant</a:t>
-                      </a:r>
-                      <a:endParaRPr lang="fr-FR" dirty="0"/>
                     </a:p>
                     <a:p>
                       <a:pPr algn="l"/>
                       <a:r>
                         <a:rPr lang="fr-FR" dirty="0"/>
-                        <a:t>Remplir </a:t>
+                        <a:t>Remplir command</a:t>
                       </a:r>
-                      <a:r>
-                        <a:rPr lang="fr-FR" dirty="0" err="1"/>
-                        <a:t>comm</a:t>
-                      </a:r>
-                      <a:endParaRPr lang="fr-FR" dirty="0"/>
                     </a:p>
                     <a:p>
                       <a:pPr algn="l"/>

</xml_diff>